<commit_message>
Updates for Mon 9/21
</commit_message>
<xml_diff>
--- a/16317/f15/lectures/16.317f15_lec7_arith.pptx
+++ b/16317/f15/lectures/16.317f15_lec7_arith.pptx
@@ -5,10 +5,10 @@
     <p:sldMasterId id="2147483792" r:id="rId1"/>
   </p:sldMasterIdLst>
   <p:notesMasterIdLst>
-    <p:notesMasterId r:id="rId17"/>
+    <p:notesMasterId r:id="rId11"/>
   </p:notesMasterIdLst>
   <p:handoutMasterIdLst>
-    <p:handoutMasterId r:id="rId18"/>
+    <p:handoutMasterId r:id="rId12"/>
   </p:handoutMasterIdLst>
   <p:sldIdLst>
     <p:sldId id="256" r:id="rId2"/>
@@ -19,13 +19,7 @@
     <p:sldId id="466" r:id="rId7"/>
     <p:sldId id="467" r:id="rId8"/>
     <p:sldId id="468" r:id="rId9"/>
-    <p:sldId id="469" r:id="rId10"/>
-    <p:sldId id="470" r:id="rId11"/>
-    <p:sldId id="471" r:id="rId12"/>
-    <p:sldId id="472" r:id="rId13"/>
-    <p:sldId id="473" r:id="rId14"/>
-    <p:sldId id="474" r:id="rId15"/>
-    <p:sldId id="379" r:id="rId16"/>
+    <p:sldId id="379" r:id="rId10"/>
   </p:sldIdLst>
   <p:sldSz cx="9144000" cy="6858000" type="screen4x3"/>
   <p:notesSz cx="9144000" cy="6858000"/>
@@ -1278,7 +1272,7 @@
             <a:fld id="{F3403224-3FEA-AF49-99B7-763BE9E1FA7B}" type="datetime1">
               <a:rPr lang="en-US"/>
               <a:pPr/>
-              <a:t>9/16/15</a:t>
+              <a:t>9/20/15</a:t>
             </a:fld>
             <a:endParaRPr lang="en-US"/>
           </a:p>
@@ -1894,7 +1888,7 @@
           <a:p>
             <a:fld id="{6469E3C7-A601-6B4B-94DF-9CCB201B5DA9}" type="datetime1">
               <a:rPr lang="en-US" smtClean="0"/>
-              <a:t>9/16/15</a:t>
+              <a:t>9/20/15</a:t>
             </a:fld>
             <a:endParaRPr lang="en-US"/>
           </a:p>
@@ -2091,7 +2085,7 @@
           <a:p>
             <a:fld id="{0A5BB320-1C3E-B54B-A8F1-B50A8F8D3243}" type="datetime1">
               <a:rPr lang="en-US" smtClean="0"/>
-              <a:t>9/16/15</a:t>
+              <a:t>9/20/15</a:t>
             </a:fld>
             <a:endParaRPr lang="en-US"/>
           </a:p>
@@ -2297,7 +2291,7 @@
           <a:p>
             <a:fld id="{EA14E435-92E7-BA41-8166-3D2DE647DA2B}" type="datetime1">
               <a:rPr lang="en-US" smtClean="0"/>
-              <a:t>9/16/15</a:t>
+              <a:t>9/20/15</a:t>
             </a:fld>
             <a:endParaRPr lang="en-US"/>
           </a:p>
@@ -2560,7 +2554,7 @@
           <a:p>
             <a:fld id="{A672C984-1547-F74B-AF9C-E52FF4DA9847}" type="datetime1">
               <a:rPr lang="en-US" smtClean="0"/>
-              <a:t>9/16/15</a:t>
+              <a:t>9/20/15</a:t>
             </a:fld>
             <a:endParaRPr lang="en-US"/>
           </a:p>
@@ -2823,7 +2817,7 @@
           <a:p>
             <a:fld id="{C060E150-6720-0145-A31F-3F0698608DB3}" type="datetime1">
               <a:rPr lang="en-US" smtClean="0"/>
-              <a:t>9/16/15</a:t>
+              <a:t>9/20/15</a:t>
             </a:fld>
             <a:endParaRPr lang="en-US"/>
           </a:p>
@@ -3019,7 +3013,7 @@
           <a:p>
             <a:fld id="{DEAF6648-9904-C648-829B-7B02626EB97A}" type="datetime1">
               <a:rPr lang="en-US" smtClean="0"/>
-              <a:t>9/16/15</a:t>
+              <a:t>9/20/15</a:t>
             </a:fld>
             <a:endParaRPr lang="en-US"/>
           </a:p>
@@ -3237,7 +3231,7 @@
           <a:p>
             <a:fld id="{0A75491C-8C81-4646-9907-7DEFADB76198}" type="datetime1">
               <a:rPr lang="en-US" smtClean="0"/>
-              <a:t>9/16/15</a:t>
+              <a:t>9/20/15</a:t>
             </a:fld>
             <a:endParaRPr lang="en-US"/>
           </a:p>
@@ -3551,7 +3545,7 @@
           <a:p>
             <a:fld id="{47FB150C-76FF-C845-A6E2-2B7AC0FD271A}" type="datetime1">
               <a:rPr lang="en-US" smtClean="0"/>
-              <a:t>9/16/15</a:t>
+              <a:t>9/20/15</a:t>
             </a:fld>
             <a:endParaRPr lang="en-US"/>
           </a:p>
@@ -4004,7 +3998,7 @@
           <a:p>
             <a:fld id="{06BF1CD6-646C-9748-99AD-904A7C69BAB9}" type="datetime1">
               <a:rPr lang="en-US" smtClean="0"/>
-              <a:t>9/16/15</a:t>
+              <a:t>9/20/15</a:t>
             </a:fld>
             <a:endParaRPr lang="en-US"/>
           </a:p>
@@ -4148,7 +4142,7 @@
           <a:p>
             <a:fld id="{979C3B97-44BF-6D4F-A91D-DC0F33E6DE5F}" type="datetime1">
               <a:rPr lang="en-US" smtClean="0"/>
-              <a:t>9/16/15</a:t>
+              <a:t>9/20/15</a:t>
             </a:fld>
             <a:endParaRPr lang="en-US"/>
           </a:p>
@@ -4269,7 +4263,7 @@
           <a:p>
             <a:fld id="{D1CB885C-743B-9040-B6F0-97E001F9F34B}" type="datetime1">
               <a:rPr lang="en-US" smtClean="0"/>
-              <a:t>9/16/15</a:t>
+              <a:t>9/20/15</a:t>
             </a:fld>
             <a:endParaRPr lang="en-US"/>
           </a:p>
@@ -4572,7 +4566,7 @@
           <a:p>
             <a:fld id="{7510D34D-FE4C-894E-9991-C8AAFF48CBAF}" type="datetime1">
               <a:rPr lang="en-US" smtClean="0"/>
-              <a:t>9/16/15</a:t>
+              <a:t>9/20/15</a:t>
             </a:fld>
             <a:endParaRPr lang="en-US"/>
           </a:p>
@@ -4852,7 +4846,7 @@
           <a:p>
             <a:fld id="{121D7A21-72C5-5247-9ECE-A8206B0D55C9}" type="datetime1">
               <a:rPr lang="en-US" smtClean="0"/>
-              <a:t>9/16/15</a:t>
+              <a:t>9/20/15</a:t>
             </a:fld>
             <a:endParaRPr lang="en-US"/>
           </a:p>
@@ -5151,7 +5145,7 @@
           <a:p>
             <a:fld id="{D4576812-6AB6-2F40-BB3B-3BDC9703BFD3}" type="datetime1">
               <a:rPr lang="en-US" smtClean="0"/>
-              <a:t>9/16/15</a:t>
+              <a:t>9/20/15</a:t>
             </a:fld>
             <a:endParaRPr lang="en-US"/>
           </a:p>
@@ -6001,3659 +5995,10 @@
               <a:rPr lang="en-US" dirty="0" smtClean="0">
                 <a:latin typeface="Arial" charset="0"/>
               </a:rPr>
-              <a:t>Arithmetic </a:t>
-            </a:r>
-            <a:r>
-              <a:rPr lang="en-US" dirty="0" smtClean="0">
-                <a:latin typeface="Arial" charset="0"/>
-              </a:rPr>
-              <a:t>instructions</a:t>
+              <a:t>Arithmetic instructions</a:t>
             </a:r>
             <a:endParaRPr lang="en-US" dirty="0">
               <a:latin typeface="Arial" charset="0"/>
-            </a:endParaRPr>
-          </a:p>
-        </p:txBody>
-      </p:sp>
-    </p:spTree>
-  </p:cSld>
-  <p:clrMapOvr>
-    <a:masterClrMapping/>
-  </p:clrMapOvr>
-  <p:timing>
-    <p:tnLst>
-      <p:par>
-        <p:cTn xmlns:p14="http://schemas.microsoft.com/office/powerpoint/2010/main" id="1" dur="indefinite" restart="never" nodeType="tmRoot"/>
-      </p:par>
-    </p:tnLst>
-  </p:timing>
-</p:sld>
-</file>
-
-<file path=ppt/slides/slide10.xml><?xml version="1.0" encoding="utf-8"?>
-<p:sld xmlns:a="http://schemas.openxmlformats.org/drawingml/2006/main" xmlns:r="http://schemas.openxmlformats.org/officeDocument/2006/relationships" xmlns:p="http://schemas.openxmlformats.org/presentationml/2006/main">
-  <p:cSld>
-    <p:spTree>
-      <p:nvGrpSpPr>
-        <p:cNvPr id="1" name=""/>
-        <p:cNvGrpSpPr/>
-        <p:nvPr/>
-      </p:nvGrpSpPr>
-      <p:grpSpPr>
-        <a:xfrm>
-          <a:off x="0" y="0"/>
-          <a:ext cx="0" cy="0"/>
-          <a:chOff x="0" y="0"/>
-          <a:chExt cx="0" cy="0"/>
-        </a:xfrm>
-      </p:grpSpPr>
-      <p:sp>
-        <p:nvSpPr>
-          <p:cNvPr id="8194" name="Title 1"/>
-          <p:cNvSpPr>
-            <a:spLocks noGrp="1"/>
-          </p:cNvSpPr>
-          <p:nvPr>
-            <p:ph type="title"/>
-          </p:nvPr>
-        </p:nvSpPr>
-        <p:spPr/>
-        <p:txBody>
-          <a:bodyPr/>
-          <a:lstStyle/>
-          <a:p>
-            <a:r>
-              <a:rPr lang="en-US">
-                <a:latin typeface="Garamond" charset="0"/>
-              </a:rPr>
-              <a:t>MUL/IMUL</a:t>
-            </a:r>
-          </a:p>
-        </p:txBody>
-      </p:sp>
-      <p:sp>
-        <p:nvSpPr>
-          <p:cNvPr id="8195" name="Content Placeholder 2"/>
-          <p:cNvSpPr>
-            <a:spLocks noGrp="1"/>
-          </p:cNvSpPr>
-          <p:nvPr>
-            <p:ph idx="1"/>
-          </p:nvPr>
-        </p:nvSpPr>
-        <p:spPr/>
-        <p:txBody>
-          <a:bodyPr/>
-          <a:lstStyle/>
-          <a:p>
-            <a:r>
-              <a:rPr lang="en-US">
-                <a:latin typeface="Arial" charset="0"/>
-              </a:rPr>
-              <a:t>MUL S </a:t>
-            </a:r>
-            <a:r>
-              <a:rPr lang="en-US">
-                <a:latin typeface="Arial" charset="0"/>
-                <a:sym typeface="Wingdings" charset="0"/>
-              </a:rPr>
-              <a:t> unsigned multiplication</a:t>
-            </a:r>
-          </a:p>
-          <a:p>
-            <a:r>
-              <a:rPr lang="en-US">
-                <a:latin typeface="Arial" charset="0"/>
-                <a:sym typeface="Wingdings" charset="0"/>
-              </a:rPr>
-              <a:t>IMUL S  signed multiplication</a:t>
-            </a:r>
-            <a:endParaRPr lang="en-US">
-              <a:latin typeface="Arial" charset="0"/>
-            </a:endParaRPr>
-          </a:p>
-          <a:p>
-            <a:r>
-              <a:rPr lang="en-US">
-                <a:latin typeface="Arial" charset="0"/>
-              </a:rPr>
-              <a:t>Byte: (AX) = (AL) * (S)</a:t>
-            </a:r>
-          </a:p>
-          <a:p>
-            <a:r>
-              <a:rPr lang="en-US">
-                <a:latin typeface="Arial" charset="0"/>
-              </a:rPr>
-              <a:t>Word: (DX,AX) = (AX) * (S)</a:t>
-            </a:r>
-          </a:p>
-          <a:p>
-            <a:r>
-              <a:rPr lang="en-US">
-                <a:latin typeface="Arial" charset="0"/>
-              </a:rPr>
-              <a:t>Double-word: (EDX,EAX) = (EAX) * (S)</a:t>
-            </a:r>
-          </a:p>
-          <a:p>
-            <a:r>
-              <a:rPr lang="en-US">
-                <a:latin typeface="Arial" charset="0"/>
-              </a:rPr>
-              <a:t>Only CF, OF updated</a:t>
-            </a:r>
-          </a:p>
-        </p:txBody>
-      </p:sp>
-      <p:sp>
-        <p:nvSpPr>
-          <p:cNvPr id="4" name="Date Placeholder 3"/>
-          <p:cNvSpPr>
-            <a:spLocks noGrp="1"/>
-          </p:cNvSpPr>
-          <p:nvPr>
-            <p:ph type="dt" sz="quarter" idx="10"/>
-          </p:nvPr>
-        </p:nvSpPr>
-        <p:spPr/>
-        <p:txBody>
-          <a:bodyPr/>
-          <a:lstStyle>
-            <a:lvl1pPr eaLnBrk="0" hangingPunct="0">
-              <a:defRPr>
-                <a:solidFill>
-                  <a:schemeClr val="tx1"/>
-                </a:solidFill>
-                <a:latin typeface="Arial" charset="0"/>
-                <a:ea typeface="ＭＳ Ｐゴシック" charset="0"/>
-                <a:cs typeface="Arial" charset="0"/>
-              </a:defRPr>
-            </a:lvl1pPr>
-            <a:lvl2pPr marL="742950" indent="-285750" eaLnBrk="0" hangingPunct="0">
-              <a:defRPr>
-                <a:solidFill>
-                  <a:schemeClr val="tx1"/>
-                </a:solidFill>
-                <a:latin typeface="Arial" charset="0"/>
-                <a:ea typeface="Arial" charset="0"/>
-                <a:cs typeface="Arial" charset="0"/>
-              </a:defRPr>
-            </a:lvl2pPr>
-            <a:lvl3pPr marL="1143000" indent="-228600" eaLnBrk="0" hangingPunct="0">
-              <a:defRPr>
-                <a:solidFill>
-                  <a:schemeClr val="tx1"/>
-                </a:solidFill>
-                <a:latin typeface="Arial" charset="0"/>
-                <a:ea typeface="Arial" charset="0"/>
-                <a:cs typeface="Arial" charset="0"/>
-              </a:defRPr>
-            </a:lvl3pPr>
-            <a:lvl4pPr marL="1600200" indent="-228600" eaLnBrk="0" hangingPunct="0">
-              <a:defRPr>
-                <a:solidFill>
-                  <a:schemeClr val="tx1"/>
-                </a:solidFill>
-                <a:latin typeface="Arial" charset="0"/>
-                <a:ea typeface="Arial" charset="0"/>
-                <a:cs typeface="Arial" charset="0"/>
-              </a:defRPr>
-            </a:lvl4pPr>
-            <a:lvl5pPr marL="2057400" indent="-228600" eaLnBrk="0" hangingPunct="0">
-              <a:defRPr>
-                <a:solidFill>
-                  <a:schemeClr val="tx1"/>
-                </a:solidFill>
-                <a:latin typeface="Arial" charset="0"/>
-                <a:ea typeface="Arial" charset="0"/>
-                <a:cs typeface="Arial" charset="0"/>
-              </a:defRPr>
-            </a:lvl5pPr>
-            <a:lvl6pPr marL="2514600" indent="-228600" eaLnBrk="0" fontAlgn="base" hangingPunct="0">
-              <a:spcBef>
-                <a:spcPct val="0"/>
-              </a:spcBef>
-              <a:spcAft>
-                <a:spcPct val="0"/>
-              </a:spcAft>
-              <a:defRPr>
-                <a:solidFill>
-                  <a:schemeClr val="tx1"/>
-                </a:solidFill>
-                <a:latin typeface="Arial" charset="0"/>
-                <a:ea typeface="Arial" charset="0"/>
-                <a:cs typeface="Arial" charset="0"/>
-              </a:defRPr>
-            </a:lvl6pPr>
-            <a:lvl7pPr marL="2971800" indent="-228600" eaLnBrk="0" fontAlgn="base" hangingPunct="0">
-              <a:spcBef>
-                <a:spcPct val="0"/>
-              </a:spcBef>
-              <a:spcAft>
-                <a:spcPct val="0"/>
-              </a:spcAft>
-              <a:defRPr>
-                <a:solidFill>
-                  <a:schemeClr val="tx1"/>
-                </a:solidFill>
-                <a:latin typeface="Arial" charset="0"/>
-                <a:ea typeface="Arial" charset="0"/>
-                <a:cs typeface="Arial" charset="0"/>
-              </a:defRPr>
-            </a:lvl7pPr>
-            <a:lvl8pPr marL="3429000" indent="-228600" eaLnBrk="0" fontAlgn="base" hangingPunct="0">
-              <a:spcBef>
-                <a:spcPct val="0"/>
-              </a:spcBef>
-              <a:spcAft>
-                <a:spcPct val="0"/>
-              </a:spcAft>
-              <a:defRPr>
-                <a:solidFill>
-                  <a:schemeClr val="tx1"/>
-                </a:solidFill>
-                <a:latin typeface="Arial" charset="0"/>
-                <a:ea typeface="Arial" charset="0"/>
-                <a:cs typeface="Arial" charset="0"/>
-              </a:defRPr>
-            </a:lvl8pPr>
-            <a:lvl9pPr marL="3886200" indent="-228600" eaLnBrk="0" fontAlgn="base" hangingPunct="0">
-              <a:spcBef>
-                <a:spcPct val="0"/>
-              </a:spcBef>
-              <a:spcAft>
-                <a:spcPct val="0"/>
-              </a:spcAft>
-              <a:defRPr>
-                <a:solidFill>
-                  <a:schemeClr val="tx1"/>
-                </a:solidFill>
-                <a:latin typeface="Arial" charset="0"/>
-                <a:ea typeface="Arial" charset="0"/>
-                <a:cs typeface="Arial" charset="0"/>
-              </a:defRPr>
-            </a:lvl9pPr>
-          </a:lstStyle>
-          <a:p>
-            <a:pPr eaLnBrk="1" hangingPunct="1"/>
-            <a:fld id="{66CA8FC6-33F2-B444-8F04-C34E2875DEA2}" type="datetime1">
-              <a:rPr lang="en-US">
-                <a:latin typeface="Garamond" charset="0"/>
-              </a:rPr>
-              <a:pPr eaLnBrk="1" hangingPunct="1"/>
-              <a:t>9/16/15</a:t>
-            </a:fld>
-            <a:endParaRPr lang="en-US">
-              <a:latin typeface="Garamond" charset="0"/>
-            </a:endParaRPr>
-          </a:p>
-        </p:txBody>
-      </p:sp>
-      <p:sp>
-        <p:nvSpPr>
-          <p:cNvPr id="5" name="Footer Placeholder 4"/>
-          <p:cNvSpPr>
-            <a:spLocks noGrp="1"/>
-          </p:cNvSpPr>
-          <p:nvPr>
-            <p:ph type="ftr" sz="quarter" idx="11"/>
-          </p:nvPr>
-        </p:nvSpPr>
-        <p:spPr/>
-        <p:txBody>
-          <a:bodyPr/>
-          <a:lstStyle/>
-          <a:p>
-            <a:pPr>
-              <a:defRPr/>
-            </a:pPr>
-            <a:r>
-              <a:rPr lang="en-US" altLang="en-US"/>
-              <a:t>Microprocessors I:  Lecture 6</a:t>
-            </a:r>
-          </a:p>
-        </p:txBody>
-      </p:sp>
-      <p:sp>
-        <p:nvSpPr>
-          <p:cNvPr id="6" name="Slide Number Placeholder 5"/>
-          <p:cNvSpPr>
-            <a:spLocks noGrp="1"/>
-          </p:cNvSpPr>
-          <p:nvPr>
-            <p:ph type="sldNum" sz="quarter" idx="12"/>
-          </p:nvPr>
-        </p:nvSpPr>
-        <p:spPr/>
-        <p:txBody>
-          <a:bodyPr/>
-          <a:lstStyle>
-            <a:lvl1pPr eaLnBrk="0" hangingPunct="0">
-              <a:defRPr>
-                <a:solidFill>
-                  <a:schemeClr val="tx1"/>
-                </a:solidFill>
-                <a:latin typeface="Arial" charset="0"/>
-                <a:ea typeface="ＭＳ Ｐゴシック" charset="0"/>
-                <a:cs typeface="Arial" charset="0"/>
-              </a:defRPr>
-            </a:lvl1pPr>
-            <a:lvl2pPr marL="742950" indent="-285750" eaLnBrk="0" hangingPunct="0">
-              <a:defRPr>
-                <a:solidFill>
-                  <a:schemeClr val="tx1"/>
-                </a:solidFill>
-                <a:latin typeface="Arial" charset="0"/>
-                <a:ea typeface="Arial" charset="0"/>
-                <a:cs typeface="Arial" charset="0"/>
-              </a:defRPr>
-            </a:lvl2pPr>
-            <a:lvl3pPr marL="1143000" indent="-228600" eaLnBrk="0" hangingPunct="0">
-              <a:defRPr>
-                <a:solidFill>
-                  <a:schemeClr val="tx1"/>
-                </a:solidFill>
-                <a:latin typeface="Arial" charset="0"/>
-                <a:ea typeface="Arial" charset="0"/>
-                <a:cs typeface="Arial" charset="0"/>
-              </a:defRPr>
-            </a:lvl3pPr>
-            <a:lvl4pPr marL="1600200" indent="-228600" eaLnBrk="0" hangingPunct="0">
-              <a:defRPr>
-                <a:solidFill>
-                  <a:schemeClr val="tx1"/>
-                </a:solidFill>
-                <a:latin typeface="Arial" charset="0"/>
-                <a:ea typeface="Arial" charset="0"/>
-                <a:cs typeface="Arial" charset="0"/>
-              </a:defRPr>
-            </a:lvl4pPr>
-            <a:lvl5pPr marL="2057400" indent="-228600" eaLnBrk="0" hangingPunct="0">
-              <a:defRPr>
-                <a:solidFill>
-                  <a:schemeClr val="tx1"/>
-                </a:solidFill>
-                <a:latin typeface="Arial" charset="0"/>
-                <a:ea typeface="Arial" charset="0"/>
-                <a:cs typeface="Arial" charset="0"/>
-              </a:defRPr>
-            </a:lvl5pPr>
-            <a:lvl6pPr marL="2514600" indent="-228600" eaLnBrk="0" fontAlgn="base" hangingPunct="0">
-              <a:spcBef>
-                <a:spcPct val="0"/>
-              </a:spcBef>
-              <a:spcAft>
-                <a:spcPct val="0"/>
-              </a:spcAft>
-              <a:defRPr>
-                <a:solidFill>
-                  <a:schemeClr val="tx1"/>
-                </a:solidFill>
-                <a:latin typeface="Arial" charset="0"/>
-                <a:ea typeface="Arial" charset="0"/>
-                <a:cs typeface="Arial" charset="0"/>
-              </a:defRPr>
-            </a:lvl6pPr>
-            <a:lvl7pPr marL="2971800" indent="-228600" eaLnBrk="0" fontAlgn="base" hangingPunct="0">
-              <a:spcBef>
-                <a:spcPct val="0"/>
-              </a:spcBef>
-              <a:spcAft>
-                <a:spcPct val="0"/>
-              </a:spcAft>
-              <a:defRPr>
-                <a:solidFill>
-                  <a:schemeClr val="tx1"/>
-                </a:solidFill>
-                <a:latin typeface="Arial" charset="0"/>
-                <a:ea typeface="Arial" charset="0"/>
-                <a:cs typeface="Arial" charset="0"/>
-              </a:defRPr>
-            </a:lvl7pPr>
-            <a:lvl8pPr marL="3429000" indent="-228600" eaLnBrk="0" fontAlgn="base" hangingPunct="0">
-              <a:spcBef>
-                <a:spcPct val="0"/>
-              </a:spcBef>
-              <a:spcAft>
-                <a:spcPct val="0"/>
-              </a:spcAft>
-              <a:defRPr>
-                <a:solidFill>
-                  <a:schemeClr val="tx1"/>
-                </a:solidFill>
-                <a:latin typeface="Arial" charset="0"/>
-                <a:ea typeface="Arial" charset="0"/>
-                <a:cs typeface="Arial" charset="0"/>
-              </a:defRPr>
-            </a:lvl8pPr>
-            <a:lvl9pPr marL="3886200" indent="-228600" eaLnBrk="0" fontAlgn="base" hangingPunct="0">
-              <a:spcBef>
-                <a:spcPct val="0"/>
-              </a:spcBef>
-              <a:spcAft>
-                <a:spcPct val="0"/>
-              </a:spcAft>
-              <a:defRPr>
-                <a:solidFill>
-                  <a:schemeClr val="tx1"/>
-                </a:solidFill>
-                <a:latin typeface="Arial" charset="0"/>
-                <a:ea typeface="Arial" charset="0"/>
-                <a:cs typeface="Arial" charset="0"/>
-              </a:defRPr>
-            </a:lvl9pPr>
-          </a:lstStyle>
-          <a:p>
-            <a:pPr eaLnBrk="1" hangingPunct="1"/>
-            <a:fld id="{7D17A237-DC05-BC44-9260-0103FC72B570}" type="slidenum">
-              <a:rPr lang="en-US">
-                <a:latin typeface="Garamond" charset="0"/>
-              </a:rPr>
-              <a:pPr eaLnBrk="1" hangingPunct="1"/>
-              <a:t>10</a:t>
-            </a:fld>
-            <a:endParaRPr lang="en-US">
-              <a:latin typeface="Garamond" charset="0"/>
-            </a:endParaRPr>
-          </a:p>
-        </p:txBody>
-      </p:sp>
-    </p:spTree>
-    <p:extLst>
-      <p:ext uri="{BB962C8B-B14F-4D97-AF65-F5344CB8AC3E}">
-        <p14:creationId xmlns:p14="http://schemas.microsoft.com/office/powerpoint/2010/main" val="3032909770"/>
-      </p:ext>
-    </p:extLst>
-  </p:cSld>
-  <p:clrMapOvr>
-    <a:masterClrMapping/>
-  </p:clrMapOvr>
-  <p:timing>
-    <p:tnLst>
-      <p:par>
-        <p:cTn xmlns:p14="http://schemas.microsoft.com/office/powerpoint/2010/main" id="1" dur="indefinite" restart="never" nodeType="tmRoot"/>
-      </p:par>
-    </p:tnLst>
-  </p:timing>
-</p:sld>
-</file>
-
-<file path=ppt/slides/slide11.xml><?xml version="1.0" encoding="utf-8"?>
-<p:sld xmlns:a="http://schemas.openxmlformats.org/drawingml/2006/main" xmlns:r="http://schemas.openxmlformats.org/officeDocument/2006/relationships" xmlns:p="http://schemas.openxmlformats.org/presentationml/2006/main">
-  <p:cSld>
-    <p:spTree>
-      <p:nvGrpSpPr>
-        <p:cNvPr id="1" name=""/>
-        <p:cNvGrpSpPr/>
-        <p:nvPr/>
-      </p:nvGrpSpPr>
-      <p:grpSpPr>
-        <a:xfrm>
-          <a:off x="0" y="0"/>
-          <a:ext cx="0" cy="0"/>
-          <a:chOff x="0" y="0"/>
-          <a:chExt cx="0" cy="0"/>
-        </a:xfrm>
-      </p:grpSpPr>
-      <p:sp>
-        <p:nvSpPr>
-          <p:cNvPr id="9218" name="Title 1"/>
-          <p:cNvSpPr>
-            <a:spLocks noGrp="1"/>
-          </p:cNvSpPr>
-          <p:nvPr>
-            <p:ph type="title"/>
-          </p:nvPr>
-        </p:nvSpPr>
-        <p:spPr/>
-        <p:txBody>
-          <a:bodyPr/>
-          <a:lstStyle/>
-          <a:p>
-            <a:r>
-              <a:rPr lang="en-US">
-                <a:latin typeface="Garamond" charset="0"/>
-              </a:rPr>
-              <a:t>DIV/IDIV</a:t>
-            </a:r>
-          </a:p>
-        </p:txBody>
-      </p:sp>
-      <p:sp>
-        <p:nvSpPr>
-          <p:cNvPr id="3" name="Content Placeholder 2"/>
-          <p:cNvSpPr>
-            <a:spLocks noGrp="1"/>
-          </p:cNvSpPr>
-          <p:nvPr>
-            <p:ph idx="1"/>
-          </p:nvPr>
-        </p:nvSpPr>
-        <p:spPr/>
-        <p:txBody>
-          <a:bodyPr>
-            <a:normAutofit/>
-          </a:bodyPr>
-          <a:lstStyle/>
-          <a:p>
-            <a:pPr>
-              <a:lnSpc>
-                <a:spcPct val="80000"/>
-              </a:lnSpc>
-            </a:pPr>
-            <a:r>
-              <a:rPr lang="en-US" sz="2800">
-                <a:latin typeface="Arial" charset="0"/>
-              </a:rPr>
-              <a:t>DIV S </a:t>
-            </a:r>
-            <a:r>
-              <a:rPr lang="en-US" sz="2800">
-                <a:latin typeface="Arial" charset="0"/>
-                <a:sym typeface="Wingdings" charset="0"/>
-              </a:rPr>
-              <a:t> unsigned division</a:t>
-            </a:r>
-          </a:p>
-          <a:p>
-            <a:pPr>
-              <a:lnSpc>
-                <a:spcPct val="80000"/>
-              </a:lnSpc>
-            </a:pPr>
-            <a:r>
-              <a:rPr lang="en-US" sz="2800">
-                <a:latin typeface="Arial" charset="0"/>
-                <a:sym typeface="Wingdings" charset="0"/>
-              </a:rPr>
-              <a:t>IDIV S  signed division</a:t>
-            </a:r>
-          </a:p>
-          <a:p>
-            <a:pPr>
-              <a:lnSpc>
-                <a:spcPct val="80000"/>
-              </a:lnSpc>
-            </a:pPr>
-            <a:r>
-              <a:rPr lang="en-US" sz="2800">
-                <a:latin typeface="Arial" charset="0"/>
-                <a:sym typeface="Wingdings" charset="0"/>
-              </a:rPr>
-              <a:t>Result split into quotient, remainder</a:t>
-            </a:r>
-          </a:p>
-          <a:p>
-            <a:pPr>
-              <a:lnSpc>
-                <a:spcPct val="80000"/>
-              </a:lnSpc>
-            </a:pPr>
-            <a:r>
-              <a:rPr lang="en-US" sz="2800">
-                <a:latin typeface="Arial" charset="0"/>
-                <a:sym typeface="Wingdings" charset="0"/>
-              </a:rPr>
-              <a:t>Byte: 	(AL) = (AX) / (S)</a:t>
-            </a:r>
-          </a:p>
-          <a:p>
-            <a:pPr>
-              <a:lnSpc>
-                <a:spcPct val="80000"/>
-              </a:lnSpc>
-              <a:buFont typeface="Wingdings" charset="0"/>
-              <a:buNone/>
-            </a:pPr>
-            <a:r>
-              <a:rPr lang="en-US" sz="2800">
-                <a:latin typeface="Arial" charset="0"/>
-                <a:sym typeface="Wingdings" charset="0"/>
-              </a:rPr>
-              <a:t>		(AH) = (AX) % (S)</a:t>
-            </a:r>
-          </a:p>
-          <a:p>
-            <a:pPr>
-              <a:lnSpc>
-                <a:spcPct val="80000"/>
-              </a:lnSpc>
-            </a:pPr>
-            <a:r>
-              <a:rPr lang="en-US" sz="2800">
-                <a:latin typeface="Arial" charset="0"/>
-              </a:rPr>
-              <a:t>Word:	(AX) = (DX,AX) / (S)</a:t>
-            </a:r>
-          </a:p>
-          <a:p>
-            <a:pPr>
-              <a:lnSpc>
-                <a:spcPct val="80000"/>
-              </a:lnSpc>
-              <a:buFont typeface="Wingdings" charset="0"/>
-              <a:buNone/>
-            </a:pPr>
-            <a:r>
-              <a:rPr lang="en-US" sz="2800">
-                <a:latin typeface="Arial" charset="0"/>
-              </a:rPr>
-              <a:t>		(DX) = (DX,AX) % (S)</a:t>
-            </a:r>
-          </a:p>
-          <a:p>
-            <a:pPr>
-              <a:lnSpc>
-                <a:spcPct val="80000"/>
-              </a:lnSpc>
-            </a:pPr>
-            <a:r>
-              <a:rPr lang="en-US" sz="2800">
-                <a:latin typeface="Arial" charset="0"/>
-              </a:rPr>
-              <a:t>Dword:	(EAX) = (EDX,EAX) / (S)</a:t>
-            </a:r>
-          </a:p>
-          <a:p>
-            <a:pPr>
-              <a:lnSpc>
-                <a:spcPct val="80000"/>
-              </a:lnSpc>
-              <a:buFont typeface="Wingdings" charset="0"/>
-              <a:buNone/>
-            </a:pPr>
-            <a:r>
-              <a:rPr lang="en-US" sz="2800">
-                <a:latin typeface="Arial" charset="0"/>
-              </a:rPr>
-              <a:t>		(EDX) = (EDX,EAX) % (S)</a:t>
-            </a:r>
-          </a:p>
-          <a:p>
-            <a:pPr>
-              <a:lnSpc>
-                <a:spcPct val="80000"/>
-              </a:lnSpc>
-            </a:pPr>
-            <a:r>
-              <a:rPr lang="en-US" sz="2800">
-                <a:latin typeface="Arial" charset="0"/>
-                <a:sym typeface="Wingdings" charset="0"/>
-              </a:rPr>
-              <a:t>Special </a:t>
-            </a:r>
-            <a:r>
-              <a:rPr lang="ja-JP" altLang="en-US" sz="2800">
-                <a:latin typeface="Arial" charset="0"/>
-                <a:sym typeface="Wingdings" charset="0"/>
-              </a:rPr>
-              <a:t>“</a:t>
-            </a:r>
-            <a:r>
-              <a:rPr lang="en-US" sz="2800">
-                <a:latin typeface="Arial" charset="0"/>
-                <a:sym typeface="Wingdings" charset="0"/>
-              </a:rPr>
-              <a:t>convert</a:t>
-            </a:r>
-            <a:r>
-              <a:rPr lang="ja-JP" altLang="en-US" sz="2800">
-                <a:latin typeface="Arial" charset="0"/>
-                <a:sym typeface="Wingdings" charset="0"/>
-              </a:rPr>
-              <a:t>”</a:t>
-            </a:r>
-            <a:r>
-              <a:rPr lang="en-US" sz="2800">
-                <a:latin typeface="Arial" charset="0"/>
-                <a:sym typeface="Wingdings" charset="0"/>
-              </a:rPr>
-              <a:t> instructions used to sign-extend value in register A before division</a:t>
-            </a:r>
-          </a:p>
-          <a:p>
-            <a:pPr>
-              <a:lnSpc>
-                <a:spcPct val="80000"/>
-              </a:lnSpc>
-              <a:buFont typeface="Wingdings" charset="0"/>
-              <a:buNone/>
-            </a:pPr>
-            <a:endParaRPr lang="en-US" sz="2800">
-              <a:latin typeface="Arial" charset="0"/>
-            </a:endParaRPr>
-          </a:p>
-        </p:txBody>
-      </p:sp>
-      <p:sp>
-        <p:nvSpPr>
-          <p:cNvPr id="4" name="Date Placeholder 3"/>
-          <p:cNvSpPr>
-            <a:spLocks noGrp="1"/>
-          </p:cNvSpPr>
-          <p:nvPr>
-            <p:ph type="dt" sz="quarter" idx="10"/>
-          </p:nvPr>
-        </p:nvSpPr>
-        <p:spPr/>
-        <p:txBody>
-          <a:bodyPr/>
-          <a:lstStyle>
-            <a:lvl1pPr eaLnBrk="0" hangingPunct="0">
-              <a:defRPr>
-                <a:solidFill>
-                  <a:schemeClr val="tx1"/>
-                </a:solidFill>
-                <a:latin typeface="Arial" charset="0"/>
-                <a:ea typeface="ＭＳ Ｐゴシック" charset="0"/>
-                <a:cs typeface="Arial" charset="0"/>
-              </a:defRPr>
-            </a:lvl1pPr>
-            <a:lvl2pPr marL="742950" indent="-285750" eaLnBrk="0" hangingPunct="0">
-              <a:defRPr>
-                <a:solidFill>
-                  <a:schemeClr val="tx1"/>
-                </a:solidFill>
-                <a:latin typeface="Arial" charset="0"/>
-                <a:ea typeface="Arial" charset="0"/>
-                <a:cs typeface="Arial" charset="0"/>
-              </a:defRPr>
-            </a:lvl2pPr>
-            <a:lvl3pPr marL="1143000" indent="-228600" eaLnBrk="0" hangingPunct="0">
-              <a:defRPr>
-                <a:solidFill>
-                  <a:schemeClr val="tx1"/>
-                </a:solidFill>
-                <a:latin typeface="Arial" charset="0"/>
-                <a:ea typeface="Arial" charset="0"/>
-                <a:cs typeface="Arial" charset="0"/>
-              </a:defRPr>
-            </a:lvl3pPr>
-            <a:lvl4pPr marL="1600200" indent="-228600" eaLnBrk="0" hangingPunct="0">
-              <a:defRPr>
-                <a:solidFill>
-                  <a:schemeClr val="tx1"/>
-                </a:solidFill>
-                <a:latin typeface="Arial" charset="0"/>
-                <a:ea typeface="Arial" charset="0"/>
-                <a:cs typeface="Arial" charset="0"/>
-              </a:defRPr>
-            </a:lvl4pPr>
-            <a:lvl5pPr marL="2057400" indent="-228600" eaLnBrk="0" hangingPunct="0">
-              <a:defRPr>
-                <a:solidFill>
-                  <a:schemeClr val="tx1"/>
-                </a:solidFill>
-                <a:latin typeface="Arial" charset="0"/>
-                <a:ea typeface="Arial" charset="0"/>
-                <a:cs typeface="Arial" charset="0"/>
-              </a:defRPr>
-            </a:lvl5pPr>
-            <a:lvl6pPr marL="2514600" indent="-228600" eaLnBrk="0" fontAlgn="base" hangingPunct="0">
-              <a:spcBef>
-                <a:spcPct val="0"/>
-              </a:spcBef>
-              <a:spcAft>
-                <a:spcPct val="0"/>
-              </a:spcAft>
-              <a:defRPr>
-                <a:solidFill>
-                  <a:schemeClr val="tx1"/>
-                </a:solidFill>
-                <a:latin typeface="Arial" charset="0"/>
-                <a:ea typeface="Arial" charset="0"/>
-                <a:cs typeface="Arial" charset="0"/>
-              </a:defRPr>
-            </a:lvl6pPr>
-            <a:lvl7pPr marL="2971800" indent="-228600" eaLnBrk="0" fontAlgn="base" hangingPunct="0">
-              <a:spcBef>
-                <a:spcPct val="0"/>
-              </a:spcBef>
-              <a:spcAft>
-                <a:spcPct val="0"/>
-              </a:spcAft>
-              <a:defRPr>
-                <a:solidFill>
-                  <a:schemeClr val="tx1"/>
-                </a:solidFill>
-                <a:latin typeface="Arial" charset="0"/>
-                <a:ea typeface="Arial" charset="0"/>
-                <a:cs typeface="Arial" charset="0"/>
-              </a:defRPr>
-            </a:lvl7pPr>
-            <a:lvl8pPr marL="3429000" indent="-228600" eaLnBrk="0" fontAlgn="base" hangingPunct="0">
-              <a:spcBef>
-                <a:spcPct val="0"/>
-              </a:spcBef>
-              <a:spcAft>
-                <a:spcPct val="0"/>
-              </a:spcAft>
-              <a:defRPr>
-                <a:solidFill>
-                  <a:schemeClr val="tx1"/>
-                </a:solidFill>
-                <a:latin typeface="Arial" charset="0"/>
-                <a:ea typeface="Arial" charset="0"/>
-                <a:cs typeface="Arial" charset="0"/>
-              </a:defRPr>
-            </a:lvl8pPr>
-            <a:lvl9pPr marL="3886200" indent="-228600" eaLnBrk="0" fontAlgn="base" hangingPunct="0">
-              <a:spcBef>
-                <a:spcPct val="0"/>
-              </a:spcBef>
-              <a:spcAft>
-                <a:spcPct val="0"/>
-              </a:spcAft>
-              <a:defRPr>
-                <a:solidFill>
-                  <a:schemeClr val="tx1"/>
-                </a:solidFill>
-                <a:latin typeface="Arial" charset="0"/>
-                <a:ea typeface="Arial" charset="0"/>
-                <a:cs typeface="Arial" charset="0"/>
-              </a:defRPr>
-            </a:lvl9pPr>
-          </a:lstStyle>
-          <a:p>
-            <a:pPr eaLnBrk="1" hangingPunct="1"/>
-            <a:fld id="{C48E59C0-10C9-4643-B128-C551A8DF3998}" type="datetime1">
-              <a:rPr lang="en-US">
-                <a:latin typeface="Garamond" charset="0"/>
-              </a:rPr>
-              <a:pPr eaLnBrk="1" hangingPunct="1"/>
-              <a:t>9/16/15</a:t>
-            </a:fld>
-            <a:endParaRPr lang="en-US">
-              <a:latin typeface="Garamond" charset="0"/>
-            </a:endParaRPr>
-          </a:p>
-        </p:txBody>
-      </p:sp>
-      <p:sp>
-        <p:nvSpPr>
-          <p:cNvPr id="5" name="Footer Placeholder 4"/>
-          <p:cNvSpPr>
-            <a:spLocks noGrp="1"/>
-          </p:cNvSpPr>
-          <p:nvPr>
-            <p:ph type="ftr" sz="quarter" idx="11"/>
-          </p:nvPr>
-        </p:nvSpPr>
-        <p:spPr/>
-        <p:txBody>
-          <a:bodyPr/>
-          <a:lstStyle/>
-          <a:p>
-            <a:pPr>
-              <a:defRPr/>
-            </a:pPr>
-            <a:r>
-              <a:rPr lang="en-US" altLang="en-US"/>
-              <a:t>Microprocessors I:  Lecture 6</a:t>
-            </a:r>
-          </a:p>
-        </p:txBody>
-      </p:sp>
-      <p:sp>
-        <p:nvSpPr>
-          <p:cNvPr id="6" name="Slide Number Placeholder 5"/>
-          <p:cNvSpPr>
-            <a:spLocks noGrp="1"/>
-          </p:cNvSpPr>
-          <p:nvPr>
-            <p:ph type="sldNum" sz="quarter" idx="12"/>
-          </p:nvPr>
-        </p:nvSpPr>
-        <p:spPr/>
-        <p:txBody>
-          <a:bodyPr/>
-          <a:lstStyle>
-            <a:lvl1pPr eaLnBrk="0" hangingPunct="0">
-              <a:defRPr>
-                <a:solidFill>
-                  <a:schemeClr val="tx1"/>
-                </a:solidFill>
-                <a:latin typeface="Arial" charset="0"/>
-                <a:ea typeface="ＭＳ Ｐゴシック" charset="0"/>
-                <a:cs typeface="Arial" charset="0"/>
-              </a:defRPr>
-            </a:lvl1pPr>
-            <a:lvl2pPr marL="742950" indent="-285750" eaLnBrk="0" hangingPunct="0">
-              <a:defRPr>
-                <a:solidFill>
-                  <a:schemeClr val="tx1"/>
-                </a:solidFill>
-                <a:latin typeface="Arial" charset="0"/>
-                <a:ea typeface="Arial" charset="0"/>
-                <a:cs typeface="Arial" charset="0"/>
-              </a:defRPr>
-            </a:lvl2pPr>
-            <a:lvl3pPr marL="1143000" indent="-228600" eaLnBrk="0" hangingPunct="0">
-              <a:defRPr>
-                <a:solidFill>
-                  <a:schemeClr val="tx1"/>
-                </a:solidFill>
-                <a:latin typeface="Arial" charset="0"/>
-                <a:ea typeface="Arial" charset="0"/>
-                <a:cs typeface="Arial" charset="0"/>
-              </a:defRPr>
-            </a:lvl3pPr>
-            <a:lvl4pPr marL="1600200" indent="-228600" eaLnBrk="0" hangingPunct="0">
-              <a:defRPr>
-                <a:solidFill>
-                  <a:schemeClr val="tx1"/>
-                </a:solidFill>
-                <a:latin typeface="Arial" charset="0"/>
-                <a:ea typeface="Arial" charset="0"/>
-                <a:cs typeface="Arial" charset="0"/>
-              </a:defRPr>
-            </a:lvl4pPr>
-            <a:lvl5pPr marL="2057400" indent="-228600" eaLnBrk="0" hangingPunct="0">
-              <a:defRPr>
-                <a:solidFill>
-                  <a:schemeClr val="tx1"/>
-                </a:solidFill>
-                <a:latin typeface="Arial" charset="0"/>
-                <a:ea typeface="Arial" charset="0"/>
-                <a:cs typeface="Arial" charset="0"/>
-              </a:defRPr>
-            </a:lvl5pPr>
-            <a:lvl6pPr marL="2514600" indent="-228600" eaLnBrk="0" fontAlgn="base" hangingPunct="0">
-              <a:spcBef>
-                <a:spcPct val="0"/>
-              </a:spcBef>
-              <a:spcAft>
-                <a:spcPct val="0"/>
-              </a:spcAft>
-              <a:defRPr>
-                <a:solidFill>
-                  <a:schemeClr val="tx1"/>
-                </a:solidFill>
-                <a:latin typeface="Arial" charset="0"/>
-                <a:ea typeface="Arial" charset="0"/>
-                <a:cs typeface="Arial" charset="0"/>
-              </a:defRPr>
-            </a:lvl6pPr>
-            <a:lvl7pPr marL="2971800" indent="-228600" eaLnBrk="0" fontAlgn="base" hangingPunct="0">
-              <a:spcBef>
-                <a:spcPct val="0"/>
-              </a:spcBef>
-              <a:spcAft>
-                <a:spcPct val="0"/>
-              </a:spcAft>
-              <a:defRPr>
-                <a:solidFill>
-                  <a:schemeClr val="tx1"/>
-                </a:solidFill>
-                <a:latin typeface="Arial" charset="0"/>
-                <a:ea typeface="Arial" charset="0"/>
-                <a:cs typeface="Arial" charset="0"/>
-              </a:defRPr>
-            </a:lvl7pPr>
-            <a:lvl8pPr marL="3429000" indent="-228600" eaLnBrk="0" fontAlgn="base" hangingPunct="0">
-              <a:spcBef>
-                <a:spcPct val="0"/>
-              </a:spcBef>
-              <a:spcAft>
-                <a:spcPct val="0"/>
-              </a:spcAft>
-              <a:defRPr>
-                <a:solidFill>
-                  <a:schemeClr val="tx1"/>
-                </a:solidFill>
-                <a:latin typeface="Arial" charset="0"/>
-                <a:ea typeface="Arial" charset="0"/>
-                <a:cs typeface="Arial" charset="0"/>
-              </a:defRPr>
-            </a:lvl8pPr>
-            <a:lvl9pPr marL="3886200" indent="-228600" eaLnBrk="0" fontAlgn="base" hangingPunct="0">
-              <a:spcBef>
-                <a:spcPct val="0"/>
-              </a:spcBef>
-              <a:spcAft>
-                <a:spcPct val="0"/>
-              </a:spcAft>
-              <a:defRPr>
-                <a:solidFill>
-                  <a:schemeClr val="tx1"/>
-                </a:solidFill>
-                <a:latin typeface="Arial" charset="0"/>
-                <a:ea typeface="Arial" charset="0"/>
-                <a:cs typeface="Arial" charset="0"/>
-              </a:defRPr>
-            </a:lvl9pPr>
-          </a:lstStyle>
-          <a:p>
-            <a:pPr eaLnBrk="1" hangingPunct="1"/>
-            <a:fld id="{8DC39F85-2198-7449-83D8-8ADFE0232C2D}" type="slidenum">
-              <a:rPr lang="en-US">
-                <a:latin typeface="Garamond" charset="0"/>
-              </a:rPr>
-              <a:pPr eaLnBrk="1" hangingPunct="1"/>
-              <a:t>11</a:t>
-            </a:fld>
-            <a:endParaRPr lang="en-US">
-              <a:latin typeface="Garamond" charset="0"/>
-            </a:endParaRPr>
-          </a:p>
-        </p:txBody>
-      </p:sp>
-    </p:spTree>
-    <p:extLst>
-      <p:ext uri="{BB962C8B-B14F-4D97-AF65-F5344CB8AC3E}">
-        <p14:creationId xmlns:p14="http://schemas.microsoft.com/office/powerpoint/2010/main" val="1954798678"/>
-      </p:ext>
-    </p:extLst>
-  </p:cSld>
-  <p:clrMapOvr>
-    <a:masterClrMapping/>
-  </p:clrMapOvr>
-  <p:timing>
-    <p:tnLst>
-      <p:par>
-        <p:cTn xmlns:p14="http://schemas.microsoft.com/office/powerpoint/2010/main" id="1" dur="indefinite" restart="never" nodeType="tmRoot"/>
-      </p:par>
-    </p:tnLst>
-  </p:timing>
-</p:sld>
-</file>
-
-<file path=ppt/slides/slide12.xml><?xml version="1.0" encoding="utf-8"?>
-<p:sld xmlns:a="http://schemas.openxmlformats.org/drawingml/2006/main" xmlns:r="http://schemas.openxmlformats.org/officeDocument/2006/relationships" xmlns:p="http://schemas.openxmlformats.org/presentationml/2006/main">
-  <p:cSld>
-    <p:spTree>
-      <p:nvGrpSpPr>
-        <p:cNvPr id="1" name=""/>
-        <p:cNvGrpSpPr/>
-        <p:nvPr/>
-      </p:nvGrpSpPr>
-      <p:grpSpPr>
-        <a:xfrm>
-          <a:off x="0" y="0"/>
-          <a:ext cx="0" cy="0"/>
-          <a:chOff x="0" y="0"/>
-          <a:chExt cx="0" cy="0"/>
-        </a:xfrm>
-      </p:grpSpPr>
-      <p:sp>
-        <p:nvSpPr>
-          <p:cNvPr id="10242" name="Title 1"/>
-          <p:cNvSpPr>
-            <a:spLocks noGrp="1"/>
-          </p:cNvSpPr>
-          <p:nvPr>
-            <p:ph type="title"/>
-          </p:nvPr>
-        </p:nvSpPr>
-        <p:spPr/>
-        <p:txBody>
-          <a:bodyPr/>
-          <a:lstStyle/>
-          <a:p>
-            <a:r>
-              <a:rPr lang="en-US">
-                <a:latin typeface="Garamond" charset="0"/>
-              </a:rPr>
-              <a:t>Example</a:t>
-            </a:r>
-          </a:p>
-        </p:txBody>
-      </p:sp>
-      <p:sp>
-        <p:nvSpPr>
-          <p:cNvPr id="3" name="Content Placeholder 2"/>
-          <p:cNvSpPr>
-            <a:spLocks noGrp="1"/>
-          </p:cNvSpPr>
-          <p:nvPr>
-            <p:ph idx="1"/>
-          </p:nvPr>
-        </p:nvSpPr>
-        <p:spPr/>
-        <p:txBody>
-          <a:bodyPr>
-            <a:normAutofit fontScale="92500" lnSpcReduction="10000"/>
-          </a:bodyPr>
-          <a:lstStyle/>
-          <a:p>
-            <a:pPr>
-              <a:buFont typeface="Wingdings" pitchFamily="2" charset="2"/>
-              <a:buChar char="n"/>
-              <a:defRPr/>
-            </a:pPr>
-            <a:r>
-              <a:rPr lang="en-US" dirty="0" smtClean="0">
-                <a:ea typeface="+mn-ea"/>
-              </a:rPr>
-              <a:t>Given</a:t>
-            </a:r>
-          </a:p>
-          <a:p>
-            <a:pPr lvl="1">
-              <a:buFont typeface="Wingdings" pitchFamily="2" charset="2"/>
-              <a:buChar char="q"/>
-              <a:defRPr/>
-            </a:pPr>
-            <a:r>
-              <a:rPr lang="en-US" dirty="0" smtClean="0"/>
-              <a:t>EAX = 00000005h</a:t>
-            </a:r>
-          </a:p>
-          <a:p>
-            <a:pPr lvl="1">
-              <a:buFont typeface="Wingdings" pitchFamily="2" charset="2"/>
-              <a:buChar char="q"/>
-              <a:defRPr/>
-            </a:pPr>
-            <a:r>
-              <a:rPr lang="en-US" dirty="0" smtClean="0"/>
-              <a:t>EBX = 0000FF02h</a:t>
-            </a:r>
-          </a:p>
-          <a:p>
-            <a:pPr>
-              <a:buFont typeface="Wingdings" pitchFamily="2" charset="2"/>
-              <a:buChar char="n"/>
-              <a:defRPr/>
-            </a:pPr>
-            <a:r>
-              <a:rPr lang="en-US" smtClean="0">
-                <a:ea typeface="+mn-ea"/>
-              </a:rPr>
-              <a:t>What </a:t>
-            </a:r>
-            <a:r>
-              <a:rPr lang="en-US" dirty="0" smtClean="0">
-                <a:ea typeface="+mn-ea"/>
-              </a:rPr>
-              <a:t>are the results of the following instructions? (Assume all instructions start with same values in registers above)</a:t>
-            </a:r>
-          </a:p>
-          <a:p>
-            <a:pPr lvl="1">
-              <a:buFont typeface="Wingdings" pitchFamily="2" charset="2"/>
-              <a:buChar char="q"/>
-              <a:defRPr/>
-            </a:pPr>
-            <a:r>
-              <a:rPr lang="en-US" dirty="0" smtClean="0"/>
-              <a:t>MUL	BL</a:t>
-            </a:r>
-          </a:p>
-          <a:p>
-            <a:pPr lvl="1">
-              <a:buFont typeface="Wingdings" pitchFamily="2" charset="2"/>
-              <a:buChar char="q"/>
-              <a:defRPr/>
-            </a:pPr>
-            <a:r>
-              <a:rPr lang="en-US" dirty="0" smtClean="0"/>
-              <a:t>MUL	BH</a:t>
-            </a:r>
-          </a:p>
-          <a:p>
-            <a:pPr lvl="1">
-              <a:buFont typeface="Wingdings" pitchFamily="2" charset="2"/>
-              <a:buChar char="q"/>
-              <a:defRPr/>
-            </a:pPr>
-            <a:r>
-              <a:rPr lang="en-US" dirty="0" smtClean="0"/>
-              <a:t>IMUL	BH</a:t>
-            </a:r>
-          </a:p>
-          <a:p>
-            <a:pPr lvl="1">
-              <a:buFont typeface="Wingdings" pitchFamily="2" charset="2"/>
-              <a:buChar char="q"/>
-              <a:defRPr/>
-            </a:pPr>
-            <a:r>
-              <a:rPr lang="en-US" dirty="0" smtClean="0"/>
-              <a:t>DIV	BL</a:t>
-            </a:r>
-          </a:p>
-          <a:p>
-            <a:pPr lvl="1">
-              <a:buFont typeface="Wingdings" pitchFamily="2" charset="2"/>
-              <a:buChar char="q"/>
-              <a:defRPr/>
-            </a:pPr>
-            <a:r>
-              <a:rPr lang="en-US" dirty="0" smtClean="0"/>
-              <a:t>DIV	BH</a:t>
-            </a:r>
-          </a:p>
-          <a:p>
-            <a:pPr lvl="1">
-              <a:buFont typeface="Wingdings" pitchFamily="2" charset="2"/>
-              <a:buChar char="q"/>
-              <a:defRPr/>
-            </a:pPr>
-            <a:r>
-              <a:rPr lang="en-US" dirty="0" smtClean="0"/>
-              <a:t>IDIV	BH</a:t>
-            </a:r>
-          </a:p>
-        </p:txBody>
-      </p:sp>
-      <p:sp>
-        <p:nvSpPr>
-          <p:cNvPr id="4" name="Date Placeholder 3"/>
-          <p:cNvSpPr>
-            <a:spLocks noGrp="1"/>
-          </p:cNvSpPr>
-          <p:nvPr>
-            <p:ph type="dt" sz="quarter" idx="10"/>
-          </p:nvPr>
-        </p:nvSpPr>
-        <p:spPr/>
-        <p:txBody>
-          <a:bodyPr/>
-          <a:lstStyle>
-            <a:lvl1pPr eaLnBrk="0" hangingPunct="0">
-              <a:defRPr>
-                <a:solidFill>
-                  <a:schemeClr val="tx1"/>
-                </a:solidFill>
-                <a:latin typeface="Arial" charset="0"/>
-                <a:ea typeface="ＭＳ Ｐゴシック" charset="0"/>
-                <a:cs typeface="Arial" charset="0"/>
-              </a:defRPr>
-            </a:lvl1pPr>
-            <a:lvl2pPr marL="742950" indent="-285750" eaLnBrk="0" hangingPunct="0">
-              <a:defRPr>
-                <a:solidFill>
-                  <a:schemeClr val="tx1"/>
-                </a:solidFill>
-                <a:latin typeface="Arial" charset="0"/>
-                <a:ea typeface="Arial" charset="0"/>
-                <a:cs typeface="Arial" charset="0"/>
-              </a:defRPr>
-            </a:lvl2pPr>
-            <a:lvl3pPr marL="1143000" indent="-228600" eaLnBrk="0" hangingPunct="0">
-              <a:defRPr>
-                <a:solidFill>
-                  <a:schemeClr val="tx1"/>
-                </a:solidFill>
-                <a:latin typeface="Arial" charset="0"/>
-                <a:ea typeface="Arial" charset="0"/>
-                <a:cs typeface="Arial" charset="0"/>
-              </a:defRPr>
-            </a:lvl3pPr>
-            <a:lvl4pPr marL="1600200" indent="-228600" eaLnBrk="0" hangingPunct="0">
-              <a:defRPr>
-                <a:solidFill>
-                  <a:schemeClr val="tx1"/>
-                </a:solidFill>
-                <a:latin typeface="Arial" charset="0"/>
-                <a:ea typeface="Arial" charset="0"/>
-                <a:cs typeface="Arial" charset="0"/>
-              </a:defRPr>
-            </a:lvl4pPr>
-            <a:lvl5pPr marL="2057400" indent="-228600" eaLnBrk="0" hangingPunct="0">
-              <a:defRPr>
-                <a:solidFill>
-                  <a:schemeClr val="tx1"/>
-                </a:solidFill>
-                <a:latin typeface="Arial" charset="0"/>
-                <a:ea typeface="Arial" charset="0"/>
-                <a:cs typeface="Arial" charset="0"/>
-              </a:defRPr>
-            </a:lvl5pPr>
-            <a:lvl6pPr marL="2514600" indent="-228600" eaLnBrk="0" fontAlgn="base" hangingPunct="0">
-              <a:spcBef>
-                <a:spcPct val="0"/>
-              </a:spcBef>
-              <a:spcAft>
-                <a:spcPct val="0"/>
-              </a:spcAft>
-              <a:defRPr>
-                <a:solidFill>
-                  <a:schemeClr val="tx1"/>
-                </a:solidFill>
-                <a:latin typeface="Arial" charset="0"/>
-                <a:ea typeface="Arial" charset="0"/>
-                <a:cs typeface="Arial" charset="0"/>
-              </a:defRPr>
-            </a:lvl6pPr>
-            <a:lvl7pPr marL="2971800" indent="-228600" eaLnBrk="0" fontAlgn="base" hangingPunct="0">
-              <a:spcBef>
-                <a:spcPct val="0"/>
-              </a:spcBef>
-              <a:spcAft>
-                <a:spcPct val="0"/>
-              </a:spcAft>
-              <a:defRPr>
-                <a:solidFill>
-                  <a:schemeClr val="tx1"/>
-                </a:solidFill>
-                <a:latin typeface="Arial" charset="0"/>
-                <a:ea typeface="Arial" charset="0"/>
-                <a:cs typeface="Arial" charset="0"/>
-              </a:defRPr>
-            </a:lvl7pPr>
-            <a:lvl8pPr marL="3429000" indent="-228600" eaLnBrk="0" fontAlgn="base" hangingPunct="0">
-              <a:spcBef>
-                <a:spcPct val="0"/>
-              </a:spcBef>
-              <a:spcAft>
-                <a:spcPct val="0"/>
-              </a:spcAft>
-              <a:defRPr>
-                <a:solidFill>
-                  <a:schemeClr val="tx1"/>
-                </a:solidFill>
-                <a:latin typeface="Arial" charset="0"/>
-                <a:ea typeface="Arial" charset="0"/>
-                <a:cs typeface="Arial" charset="0"/>
-              </a:defRPr>
-            </a:lvl8pPr>
-            <a:lvl9pPr marL="3886200" indent="-228600" eaLnBrk="0" fontAlgn="base" hangingPunct="0">
-              <a:spcBef>
-                <a:spcPct val="0"/>
-              </a:spcBef>
-              <a:spcAft>
-                <a:spcPct val="0"/>
-              </a:spcAft>
-              <a:defRPr>
-                <a:solidFill>
-                  <a:schemeClr val="tx1"/>
-                </a:solidFill>
-                <a:latin typeface="Arial" charset="0"/>
-                <a:ea typeface="Arial" charset="0"/>
-                <a:cs typeface="Arial" charset="0"/>
-              </a:defRPr>
-            </a:lvl9pPr>
-          </a:lstStyle>
-          <a:p>
-            <a:pPr eaLnBrk="1" hangingPunct="1"/>
-            <a:fld id="{F45A4B57-6329-D44B-B617-953F86EA9E00}" type="datetime1">
-              <a:rPr lang="en-US">
-                <a:latin typeface="Garamond" charset="0"/>
-              </a:rPr>
-              <a:pPr eaLnBrk="1" hangingPunct="1"/>
-              <a:t>9/16/15</a:t>
-            </a:fld>
-            <a:endParaRPr lang="en-US">
-              <a:latin typeface="Garamond" charset="0"/>
-            </a:endParaRPr>
-          </a:p>
-        </p:txBody>
-      </p:sp>
-      <p:sp>
-        <p:nvSpPr>
-          <p:cNvPr id="5" name="Footer Placeholder 4"/>
-          <p:cNvSpPr>
-            <a:spLocks noGrp="1"/>
-          </p:cNvSpPr>
-          <p:nvPr>
-            <p:ph type="ftr" sz="quarter" idx="11"/>
-          </p:nvPr>
-        </p:nvSpPr>
-        <p:spPr/>
-        <p:txBody>
-          <a:bodyPr/>
-          <a:lstStyle/>
-          <a:p>
-            <a:pPr>
-              <a:defRPr/>
-            </a:pPr>
-            <a:r>
-              <a:rPr lang="en-US" altLang="en-US"/>
-              <a:t>Microprocessors I:  Lecture 6</a:t>
-            </a:r>
-          </a:p>
-        </p:txBody>
-      </p:sp>
-      <p:sp>
-        <p:nvSpPr>
-          <p:cNvPr id="6" name="Slide Number Placeholder 5"/>
-          <p:cNvSpPr>
-            <a:spLocks noGrp="1"/>
-          </p:cNvSpPr>
-          <p:nvPr>
-            <p:ph type="sldNum" sz="quarter" idx="12"/>
-          </p:nvPr>
-        </p:nvSpPr>
-        <p:spPr/>
-        <p:txBody>
-          <a:bodyPr/>
-          <a:lstStyle>
-            <a:lvl1pPr eaLnBrk="0" hangingPunct="0">
-              <a:defRPr>
-                <a:solidFill>
-                  <a:schemeClr val="tx1"/>
-                </a:solidFill>
-                <a:latin typeface="Arial" charset="0"/>
-                <a:ea typeface="ＭＳ Ｐゴシック" charset="0"/>
-                <a:cs typeface="Arial" charset="0"/>
-              </a:defRPr>
-            </a:lvl1pPr>
-            <a:lvl2pPr marL="742950" indent="-285750" eaLnBrk="0" hangingPunct="0">
-              <a:defRPr>
-                <a:solidFill>
-                  <a:schemeClr val="tx1"/>
-                </a:solidFill>
-                <a:latin typeface="Arial" charset="0"/>
-                <a:ea typeface="Arial" charset="0"/>
-                <a:cs typeface="Arial" charset="0"/>
-              </a:defRPr>
-            </a:lvl2pPr>
-            <a:lvl3pPr marL="1143000" indent="-228600" eaLnBrk="0" hangingPunct="0">
-              <a:defRPr>
-                <a:solidFill>
-                  <a:schemeClr val="tx1"/>
-                </a:solidFill>
-                <a:latin typeface="Arial" charset="0"/>
-                <a:ea typeface="Arial" charset="0"/>
-                <a:cs typeface="Arial" charset="0"/>
-              </a:defRPr>
-            </a:lvl3pPr>
-            <a:lvl4pPr marL="1600200" indent="-228600" eaLnBrk="0" hangingPunct="0">
-              <a:defRPr>
-                <a:solidFill>
-                  <a:schemeClr val="tx1"/>
-                </a:solidFill>
-                <a:latin typeface="Arial" charset="0"/>
-                <a:ea typeface="Arial" charset="0"/>
-                <a:cs typeface="Arial" charset="0"/>
-              </a:defRPr>
-            </a:lvl4pPr>
-            <a:lvl5pPr marL="2057400" indent="-228600" eaLnBrk="0" hangingPunct="0">
-              <a:defRPr>
-                <a:solidFill>
-                  <a:schemeClr val="tx1"/>
-                </a:solidFill>
-                <a:latin typeface="Arial" charset="0"/>
-                <a:ea typeface="Arial" charset="0"/>
-                <a:cs typeface="Arial" charset="0"/>
-              </a:defRPr>
-            </a:lvl5pPr>
-            <a:lvl6pPr marL="2514600" indent="-228600" eaLnBrk="0" fontAlgn="base" hangingPunct="0">
-              <a:spcBef>
-                <a:spcPct val="0"/>
-              </a:spcBef>
-              <a:spcAft>
-                <a:spcPct val="0"/>
-              </a:spcAft>
-              <a:defRPr>
-                <a:solidFill>
-                  <a:schemeClr val="tx1"/>
-                </a:solidFill>
-                <a:latin typeface="Arial" charset="0"/>
-                <a:ea typeface="Arial" charset="0"/>
-                <a:cs typeface="Arial" charset="0"/>
-              </a:defRPr>
-            </a:lvl6pPr>
-            <a:lvl7pPr marL="2971800" indent="-228600" eaLnBrk="0" fontAlgn="base" hangingPunct="0">
-              <a:spcBef>
-                <a:spcPct val="0"/>
-              </a:spcBef>
-              <a:spcAft>
-                <a:spcPct val="0"/>
-              </a:spcAft>
-              <a:defRPr>
-                <a:solidFill>
-                  <a:schemeClr val="tx1"/>
-                </a:solidFill>
-                <a:latin typeface="Arial" charset="0"/>
-                <a:ea typeface="Arial" charset="0"/>
-                <a:cs typeface="Arial" charset="0"/>
-              </a:defRPr>
-            </a:lvl7pPr>
-            <a:lvl8pPr marL="3429000" indent="-228600" eaLnBrk="0" fontAlgn="base" hangingPunct="0">
-              <a:spcBef>
-                <a:spcPct val="0"/>
-              </a:spcBef>
-              <a:spcAft>
-                <a:spcPct val="0"/>
-              </a:spcAft>
-              <a:defRPr>
-                <a:solidFill>
-                  <a:schemeClr val="tx1"/>
-                </a:solidFill>
-                <a:latin typeface="Arial" charset="0"/>
-                <a:ea typeface="Arial" charset="0"/>
-                <a:cs typeface="Arial" charset="0"/>
-              </a:defRPr>
-            </a:lvl8pPr>
-            <a:lvl9pPr marL="3886200" indent="-228600" eaLnBrk="0" fontAlgn="base" hangingPunct="0">
-              <a:spcBef>
-                <a:spcPct val="0"/>
-              </a:spcBef>
-              <a:spcAft>
-                <a:spcPct val="0"/>
-              </a:spcAft>
-              <a:defRPr>
-                <a:solidFill>
-                  <a:schemeClr val="tx1"/>
-                </a:solidFill>
-                <a:latin typeface="Arial" charset="0"/>
-                <a:ea typeface="Arial" charset="0"/>
-                <a:cs typeface="Arial" charset="0"/>
-              </a:defRPr>
-            </a:lvl9pPr>
-          </a:lstStyle>
-          <a:p>
-            <a:pPr eaLnBrk="1" hangingPunct="1"/>
-            <a:fld id="{E9E7D69B-7498-B04C-9FE8-D21C1A6A4930}" type="slidenum">
-              <a:rPr lang="en-US">
-                <a:latin typeface="Garamond" charset="0"/>
-              </a:rPr>
-              <a:pPr eaLnBrk="1" hangingPunct="1"/>
-              <a:t>12</a:t>
-            </a:fld>
-            <a:endParaRPr lang="en-US">
-              <a:latin typeface="Garamond" charset="0"/>
-            </a:endParaRPr>
-          </a:p>
-        </p:txBody>
-      </p:sp>
-    </p:spTree>
-    <p:extLst>
-      <p:ext uri="{BB962C8B-B14F-4D97-AF65-F5344CB8AC3E}">
-        <p14:creationId xmlns:p14="http://schemas.microsoft.com/office/powerpoint/2010/main" val="2571600526"/>
-      </p:ext>
-    </p:extLst>
-  </p:cSld>
-  <p:clrMapOvr>
-    <a:masterClrMapping/>
-  </p:clrMapOvr>
-  <p:timing>
-    <p:tnLst>
-      <p:par>
-        <p:cTn xmlns:p14="http://schemas.microsoft.com/office/powerpoint/2010/main" id="1" dur="indefinite" restart="never" nodeType="tmRoot"/>
-      </p:par>
-    </p:tnLst>
-  </p:timing>
-</p:sld>
-</file>
-
-<file path=ppt/slides/slide13.xml><?xml version="1.0" encoding="utf-8"?>
-<p:sld xmlns:a="http://schemas.openxmlformats.org/drawingml/2006/main" xmlns:r="http://schemas.openxmlformats.org/officeDocument/2006/relationships" xmlns:p="http://schemas.openxmlformats.org/presentationml/2006/main">
-  <p:cSld>
-    <p:spTree>
-      <p:nvGrpSpPr>
-        <p:cNvPr id="1" name=""/>
-        <p:cNvGrpSpPr/>
-        <p:nvPr/>
-      </p:nvGrpSpPr>
-      <p:grpSpPr>
-        <a:xfrm>
-          <a:off x="0" y="0"/>
-          <a:ext cx="0" cy="0"/>
-          <a:chOff x="0" y="0"/>
-          <a:chExt cx="0" cy="0"/>
-        </a:xfrm>
-      </p:grpSpPr>
-      <p:sp>
-        <p:nvSpPr>
-          <p:cNvPr id="11266" name="Title 1"/>
-          <p:cNvSpPr>
-            <a:spLocks noGrp="1"/>
-          </p:cNvSpPr>
-          <p:nvPr>
-            <p:ph type="title"/>
-          </p:nvPr>
-        </p:nvSpPr>
-        <p:spPr/>
-        <p:txBody>
-          <a:bodyPr/>
-          <a:lstStyle/>
-          <a:p>
-            <a:r>
-              <a:rPr lang="en-US">
-                <a:latin typeface="Garamond" charset="0"/>
-              </a:rPr>
-              <a:t>Solution</a:t>
-            </a:r>
-          </a:p>
-        </p:txBody>
-      </p:sp>
-      <p:sp>
-        <p:nvSpPr>
-          <p:cNvPr id="3" name="Content Placeholder 2"/>
-          <p:cNvSpPr>
-            <a:spLocks noGrp="1"/>
-          </p:cNvSpPr>
-          <p:nvPr>
-            <p:ph idx="1"/>
-          </p:nvPr>
-        </p:nvSpPr>
-        <p:spPr/>
-        <p:txBody>
-          <a:bodyPr>
-            <a:normAutofit fontScale="92500" lnSpcReduction="20000"/>
-          </a:bodyPr>
-          <a:lstStyle/>
-          <a:p>
-            <a:pPr>
-              <a:buFont typeface="Wingdings" pitchFamily="2" charset="2"/>
-              <a:buChar char="n"/>
-              <a:defRPr/>
-            </a:pPr>
-            <a:r>
-              <a:rPr lang="en-US" dirty="0" smtClean="0">
-                <a:solidFill>
-                  <a:srgbClr val="FF0000"/>
-                </a:solidFill>
-                <a:ea typeface="+mn-ea"/>
-              </a:rPr>
-              <a:t>Consider that BH = </a:t>
-            </a:r>
-            <a:r>
-              <a:rPr lang="en-US" dirty="0" err="1" smtClean="0">
-                <a:solidFill>
-                  <a:srgbClr val="FF0000"/>
-                </a:solidFill>
-                <a:ea typeface="+mn-ea"/>
-              </a:rPr>
-              <a:t>FFh</a:t>
-            </a:r>
-            <a:r>
-              <a:rPr lang="en-US" dirty="0" smtClean="0">
-                <a:solidFill>
-                  <a:srgbClr val="FF0000"/>
-                </a:solidFill>
-                <a:ea typeface="+mn-ea"/>
-              </a:rPr>
-              <a:t> = 1111 1111</a:t>
-            </a:r>
-            <a:r>
-              <a:rPr lang="en-US" baseline="-25000" dirty="0" smtClean="0">
-                <a:solidFill>
-                  <a:srgbClr val="FF0000"/>
-                </a:solidFill>
-                <a:ea typeface="+mn-ea"/>
-              </a:rPr>
-              <a:t>2</a:t>
-            </a:r>
-            <a:endParaRPr lang="en-US" dirty="0" smtClean="0">
-              <a:solidFill>
-                <a:srgbClr val="FF0000"/>
-              </a:solidFill>
-              <a:ea typeface="+mn-ea"/>
-            </a:endParaRPr>
-          </a:p>
-          <a:p>
-            <a:pPr lvl="1">
-              <a:buFont typeface="Wingdings" pitchFamily="2" charset="2"/>
-              <a:buChar char="q"/>
-              <a:defRPr/>
-            </a:pPr>
-            <a:r>
-              <a:rPr lang="en-US" dirty="0" smtClean="0">
-                <a:solidFill>
-                  <a:srgbClr val="FF0000"/>
-                </a:solidFill>
-              </a:rPr>
-              <a:t>As unsigned value, </a:t>
-            </a:r>
-            <a:r>
-              <a:rPr lang="en-US" dirty="0" err="1" smtClean="0">
-                <a:solidFill>
-                  <a:srgbClr val="FF0000"/>
-                </a:solidFill>
-              </a:rPr>
-              <a:t>FFh</a:t>
-            </a:r>
-            <a:r>
-              <a:rPr lang="en-US" dirty="0" smtClean="0">
-                <a:solidFill>
-                  <a:srgbClr val="FF0000"/>
-                </a:solidFill>
-              </a:rPr>
-              <a:t> = 255</a:t>
-            </a:r>
-            <a:r>
-              <a:rPr lang="en-US" baseline="-25000" dirty="0" smtClean="0">
-                <a:solidFill>
-                  <a:srgbClr val="FF0000"/>
-                </a:solidFill>
-              </a:rPr>
-              <a:t>10</a:t>
-            </a:r>
-            <a:endParaRPr lang="en-US" dirty="0" smtClean="0">
-              <a:solidFill>
-                <a:srgbClr val="FF0000"/>
-              </a:solidFill>
-            </a:endParaRPr>
-          </a:p>
-          <a:p>
-            <a:pPr lvl="1">
-              <a:buFont typeface="Wingdings" pitchFamily="2" charset="2"/>
-              <a:buChar char="q"/>
-              <a:defRPr/>
-            </a:pPr>
-            <a:r>
-              <a:rPr lang="en-US" dirty="0" smtClean="0">
-                <a:solidFill>
-                  <a:srgbClr val="FF0000"/>
-                </a:solidFill>
-              </a:rPr>
-              <a:t>As signed value, </a:t>
-            </a:r>
-            <a:r>
-              <a:rPr lang="en-US" dirty="0" err="1" smtClean="0">
-                <a:solidFill>
-                  <a:srgbClr val="FF0000"/>
-                </a:solidFill>
-              </a:rPr>
-              <a:t>FFh</a:t>
-            </a:r>
-            <a:r>
-              <a:rPr lang="en-US" dirty="0" smtClean="0">
-                <a:solidFill>
-                  <a:srgbClr val="FF0000"/>
-                </a:solidFill>
-              </a:rPr>
-              <a:t> = -1</a:t>
-            </a:r>
-            <a:r>
-              <a:rPr lang="en-US" baseline="-25000" dirty="0" smtClean="0">
-                <a:solidFill>
-                  <a:srgbClr val="FF0000"/>
-                </a:solidFill>
-              </a:rPr>
-              <a:t>10</a:t>
-            </a:r>
-            <a:endParaRPr lang="en-US" dirty="0" smtClean="0">
-              <a:solidFill>
-                <a:srgbClr val="FF0000"/>
-              </a:solidFill>
-            </a:endParaRPr>
-          </a:p>
-          <a:p>
-            <a:pPr>
-              <a:buFont typeface="Wingdings" pitchFamily="2" charset="2"/>
-              <a:buChar char="n"/>
-              <a:defRPr/>
-            </a:pPr>
-            <a:r>
-              <a:rPr lang="en-US" dirty="0" smtClean="0">
-                <a:solidFill>
-                  <a:srgbClr val="FF0000"/>
-                </a:solidFill>
-                <a:ea typeface="+mn-ea"/>
-              </a:rPr>
-              <a:t>MUL	BL</a:t>
-            </a:r>
-          </a:p>
-          <a:p>
-            <a:pPr lvl="1">
-              <a:buFont typeface="Wingdings" pitchFamily="2" charset="2"/>
-              <a:buChar char="q"/>
-              <a:defRPr/>
-            </a:pPr>
-            <a:r>
-              <a:rPr lang="en-US" dirty="0" smtClean="0">
-                <a:solidFill>
-                  <a:srgbClr val="FF0000"/>
-                </a:solidFill>
-              </a:rPr>
-              <a:t>AX = AL * BL = 05h * 02h = 5 * 2 = 10</a:t>
-            </a:r>
-            <a:r>
-              <a:rPr lang="en-US" baseline="-25000" dirty="0" smtClean="0">
-                <a:solidFill>
-                  <a:srgbClr val="FF0000"/>
-                </a:solidFill>
-              </a:rPr>
-              <a:t>10</a:t>
-            </a:r>
-            <a:r>
-              <a:rPr lang="en-US" dirty="0" smtClean="0">
-                <a:solidFill>
-                  <a:srgbClr val="FF0000"/>
-                </a:solidFill>
-              </a:rPr>
-              <a:t> = </a:t>
-            </a:r>
-            <a:r>
-              <a:rPr lang="en-US" b="1" u="sng" dirty="0" smtClean="0">
-                <a:solidFill>
-                  <a:srgbClr val="FF0000"/>
-                </a:solidFill>
-              </a:rPr>
-              <a:t>000Ah</a:t>
-            </a:r>
-          </a:p>
-          <a:p>
-            <a:pPr>
-              <a:buFont typeface="Wingdings" pitchFamily="2" charset="2"/>
-              <a:buChar char="n"/>
-              <a:defRPr/>
-            </a:pPr>
-            <a:r>
-              <a:rPr lang="en-US" dirty="0" smtClean="0">
-                <a:solidFill>
-                  <a:srgbClr val="FF0000"/>
-                </a:solidFill>
-                <a:ea typeface="+mn-ea"/>
-              </a:rPr>
-              <a:t>MUL	BH</a:t>
-            </a:r>
-          </a:p>
-          <a:p>
-            <a:pPr lvl="1">
-              <a:buFont typeface="Wingdings" pitchFamily="2" charset="2"/>
-              <a:buChar char="q"/>
-              <a:defRPr/>
-            </a:pPr>
-            <a:r>
-              <a:rPr lang="en-US" dirty="0" smtClean="0">
-                <a:solidFill>
-                  <a:srgbClr val="FF0000"/>
-                </a:solidFill>
-              </a:rPr>
-              <a:t>Unsigned multiplication</a:t>
-            </a:r>
-          </a:p>
-          <a:p>
-            <a:pPr lvl="1">
-              <a:buFont typeface="Wingdings" pitchFamily="2" charset="2"/>
-              <a:buChar char="q"/>
-              <a:defRPr/>
-            </a:pPr>
-            <a:r>
-              <a:rPr lang="en-US" dirty="0" smtClean="0">
-                <a:solidFill>
-                  <a:srgbClr val="FF0000"/>
-                </a:solidFill>
-              </a:rPr>
-              <a:t>AX = AL * BH = 05h * </a:t>
-            </a:r>
-            <a:r>
-              <a:rPr lang="en-US" dirty="0" err="1" smtClean="0">
-                <a:solidFill>
-                  <a:srgbClr val="FF0000"/>
-                </a:solidFill>
-              </a:rPr>
-              <a:t>FFh</a:t>
-            </a:r>
-            <a:r>
-              <a:rPr lang="en-US" dirty="0" smtClean="0">
-                <a:solidFill>
-                  <a:srgbClr val="FF0000"/>
-                </a:solidFill>
-              </a:rPr>
-              <a:t> = 5 * 255 = 1275</a:t>
-            </a:r>
-            <a:r>
-              <a:rPr lang="en-US" baseline="-25000" dirty="0" smtClean="0">
-                <a:solidFill>
-                  <a:srgbClr val="FF0000"/>
-                </a:solidFill>
-              </a:rPr>
-              <a:t>10</a:t>
-            </a:r>
-            <a:r>
-              <a:rPr lang="en-US" dirty="0">
-                <a:solidFill>
-                  <a:srgbClr val="FF0000"/>
-                </a:solidFill>
-              </a:rPr>
-              <a:t> </a:t>
-            </a:r>
-            <a:endParaRPr lang="en-US" dirty="0" smtClean="0">
-              <a:solidFill>
-                <a:srgbClr val="FF0000"/>
-              </a:solidFill>
-            </a:endParaRPr>
-          </a:p>
-          <a:p>
-            <a:pPr marL="344487" lvl="1" indent="0">
-              <a:buFont typeface="Wingdings" pitchFamily="2" charset="2"/>
-              <a:buNone/>
-              <a:defRPr/>
-            </a:pPr>
-            <a:r>
-              <a:rPr lang="en-US" dirty="0">
-                <a:solidFill>
-                  <a:srgbClr val="FF0000"/>
-                </a:solidFill>
-              </a:rPr>
-              <a:t>	</a:t>
-            </a:r>
-            <a:r>
-              <a:rPr lang="en-US" dirty="0" smtClean="0">
-                <a:solidFill>
-                  <a:srgbClr val="FF0000"/>
-                </a:solidFill>
-              </a:rPr>
-              <a:t>   = </a:t>
-            </a:r>
-            <a:r>
-              <a:rPr lang="en-US" b="1" u="sng" dirty="0" smtClean="0">
-                <a:solidFill>
-                  <a:srgbClr val="FF0000"/>
-                </a:solidFill>
-              </a:rPr>
-              <a:t>04FBh</a:t>
-            </a:r>
-            <a:r>
-              <a:rPr lang="en-US" dirty="0" smtClean="0">
-                <a:solidFill>
-                  <a:srgbClr val="FF0000"/>
-                </a:solidFill>
-              </a:rPr>
-              <a:t> </a:t>
-            </a:r>
-          </a:p>
-          <a:p>
-            <a:pPr>
-              <a:buFont typeface="Wingdings" pitchFamily="2" charset="2"/>
-              <a:buChar char="n"/>
-              <a:defRPr/>
-            </a:pPr>
-            <a:r>
-              <a:rPr lang="en-US" dirty="0" smtClean="0">
-                <a:solidFill>
-                  <a:srgbClr val="FF0000"/>
-                </a:solidFill>
-                <a:ea typeface="+mn-ea"/>
-              </a:rPr>
-              <a:t>IMUL	BH</a:t>
-            </a:r>
-          </a:p>
-          <a:p>
-            <a:pPr lvl="1">
-              <a:buFont typeface="Wingdings" pitchFamily="2" charset="2"/>
-              <a:buChar char="q"/>
-              <a:defRPr/>
-            </a:pPr>
-            <a:r>
-              <a:rPr lang="en-US" dirty="0" smtClean="0">
-                <a:solidFill>
-                  <a:srgbClr val="FF0000"/>
-                </a:solidFill>
-              </a:rPr>
-              <a:t>Signed multiplication</a:t>
-            </a:r>
-          </a:p>
-          <a:p>
-            <a:pPr lvl="1">
-              <a:buFont typeface="Wingdings" pitchFamily="2" charset="2"/>
-              <a:buChar char="q"/>
-              <a:defRPr/>
-            </a:pPr>
-            <a:r>
-              <a:rPr lang="en-US" dirty="0" smtClean="0">
-                <a:solidFill>
-                  <a:srgbClr val="FF0000"/>
-                </a:solidFill>
-              </a:rPr>
-              <a:t>AX = AL * BH = 05h * </a:t>
-            </a:r>
-            <a:r>
-              <a:rPr lang="en-US" dirty="0" err="1" smtClean="0">
-                <a:solidFill>
-                  <a:srgbClr val="FF0000"/>
-                </a:solidFill>
-              </a:rPr>
-              <a:t>FFh</a:t>
-            </a:r>
-            <a:r>
-              <a:rPr lang="en-US" dirty="0" smtClean="0">
-                <a:solidFill>
-                  <a:srgbClr val="FF0000"/>
-                </a:solidFill>
-              </a:rPr>
-              <a:t> = 5 * -1 = -5</a:t>
-            </a:r>
-            <a:r>
-              <a:rPr lang="en-US" baseline="-25000" dirty="0" smtClean="0">
-                <a:solidFill>
-                  <a:srgbClr val="FF0000"/>
-                </a:solidFill>
-              </a:rPr>
-              <a:t>10</a:t>
-            </a:r>
-            <a:r>
-              <a:rPr lang="en-US" dirty="0" smtClean="0">
-                <a:solidFill>
-                  <a:srgbClr val="FF0000"/>
-                </a:solidFill>
-              </a:rPr>
-              <a:t> = </a:t>
-            </a:r>
-            <a:r>
-              <a:rPr lang="en-US" b="1" u="sng" dirty="0" err="1" smtClean="0">
-                <a:solidFill>
-                  <a:srgbClr val="FF0000"/>
-                </a:solidFill>
-              </a:rPr>
-              <a:t>FFFBh</a:t>
-            </a:r>
-            <a:endParaRPr lang="en-US" dirty="0" smtClean="0">
-              <a:solidFill>
-                <a:srgbClr val="FF0000"/>
-              </a:solidFill>
-            </a:endParaRPr>
-          </a:p>
-        </p:txBody>
-      </p:sp>
-      <p:sp>
-        <p:nvSpPr>
-          <p:cNvPr id="4" name="Date Placeholder 3"/>
-          <p:cNvSpPr>
-            <a:spLocks noGrp="1"/>
-          </p:cNvSpPr>
-          <p:nvPr>
-            <p:ph type="dt" sz="quarter" idx="10"/>
-          </p:nvPr>
-        </p:nvSpPr>
-        <p:spPr/>
-        <p:txBody>
-          <a:bodyPr/>
-          <a:lstStyle>
-            <a:lvl1pPr eaLnBrk="0" hangingPunct="0">
-              <a:defRPr>
-                <a:solidFill>
-                  <a:schemeClr val="tx1"/>
-                </a:solidFill>
-                <a:latin typeface="Arial" charset="0"/>
-                <a:ea typeface="ＭＳ Ｐゴシック" charset="0"/>
-                <a:cs typeface="Arial" charset="0"/>
-              </a:defRPr>
-            </a:lvl1pPr>
-            <a:lvl2pPr marL="742950" indent="-285750" eaLnBrk="0" hangingPunct="0">
-              <a:defRPr>
-                <a:solidFill>
-                  <a:schemeClr val="tx1"/>
-                </a:solidFill>
-                <a:latin typeface="Arial" charset="0"/>
-                <a:ea typeface="Arial" charset="0"/>
-                <a:cs typeface="Arial" charset="0"/>
-              </a:defRPr>
-            </a:lvl2pPr>
-            <a:lvl3pPr marL="1143000" indent="-228600" eaLnBrk="0" hangingPunct="0">
-              <a:defRPr>
-                <a:solidFill>
-                  <a:schemeClr val="tx1"/>
-                </a:solidFill>
-                <a:latin typeface="Arial" charset="0"/>
-                <a:ea typeface="Arial" charset="0"/>
-                <a:cs typeface="Arial" charset="0"/>
-              </a:defRPr>
-            </a:lvl3pPr>
-            <a:lvl4pPr marL="1600200" indent="-228600" eaLnBrk="0" hangingPunct="0">
-              <a:defRPr>
-                <a:solidFill>
-                  <a:schemeClr val="tx1"/>
-                </a:solidFill>
-                <a:latin typeface="Arial" charset="0"/>
-                <a:ea typeface="Arial" charset="0"/>
-                <a:cs typeface="Arial" charset="0"/>
-              </a:defRPr>
-            </a:lvl4pPr>
-            <a:lvl5pPr marL="2057400" indent="-228600" eaLnBrk="0" hangingPunct="0">
-              <a:defRPr>
-                <a:solidFill>
-                  <a:schemeClr val="tx1"/>
-                </a:solidFill>
-                <a:latin typeface="Arial" charset="0"/>
-                <a:ea typeface="Arial" charset="0"/>
-                <a:cs typeface="Arial" charset="0"/>
-              </a:defRPr>
-            </a:lvl5pPr>
-            <a:lvl6pPr marL="2514600" indent="-228600" eaLnBrk="0" fontAlgn="base" hangingPunct="0">
-              <a:spcBef>
-                <a:spcPct val="0"/>
-              </a:spcBef>
-              <a:spcAft>
-                <a:spcPct val="0"/>
-              </a:spcAft>
-              <a:defRPr>
-                <a:solidFill>
-                  <a:schemeClr val="tx1"/>
-                </a:solidFill>
-                <a:latin typeface="Arial" charset="0"/>
-                <a:ea typeface="Arial" charset="0"/>
-                <a:cs typeface="Arial" charset="0"/>
-              </a:defRPr>
-            </a:lvl6pPr>
-            <a:lvl7pPr marL="2971800" indent="-228600" eaLnBrk="0" fontAlgn="base" hangingPunct="0">
-              <a:spcBef>
-                <a:spcPct val="0"/>
-              </a:spcBef>
-              <a:spcAft>
-                <a:spcPct val="0"/>
-              </a:spcAft>
-              <a:defRPr>
-                <a:solidFill>
-                  <a:schemeClr val="tx1"/>
-                </a:solidFill>
-                <a:latin typeface="Arial" charset="0"/>
-                <a:ea typeface="Arial" charset="0"/>
-                <a:cs typeface="Arial" charset="0"/>
-              </a:defRPr>
-            </a:lvl7pPr>
-            <a:lvl8pPr marL="3429000" indent="-228600" eaLnBrk="0" fontAlgn="base" hangingPunct="0">
-              <a:spcBef>
-                <a:spcPct val="0"/>
-              </a:spcBef>
-              <a:spcAft>
-                <a:spcPct val="0"/>
-              </a:spcAft>
-              <a:defRPr>
-                <a:solidFill>
-                  <a:schemeClr val="tx1"/>
-                </a:solidFill>
-                <a:latin typeface="Arial" charset="0"/>
-                <a:ea typeface="Arial" charset="0"/>
-                <a:cs typeface="Arial" charset="0"/>
-              </a:defRPr>
-            </a:lvl8pPr>
-            <a:lvl9pPr marL="3886200" indent="-228600" eaLnBrk="0" fontAlgn="base" hangingPunct="0">
-              <a:spcBef>
-                <a:spcPct val="0"/>
-              </a:spcBef>
-              <a:spcAft>
-                <a:spcPct val="0"/>
-              </a:spcAft>
-              <a:defRPr>
-                <a:solidFill>
-                  <a:schemeClr val="tx1"/>
-                </a:solidFill>
-                <a:latin typeface="Arial" charset="0"/>
-                <a:ea typeface="Arial" charset="0"/>
-                <a:cs typeface="Arial" charset="0"/>
-              </a:defRPr>
-            </a:lvl9pPr>
-          </a:lstStyle>
-          <a:p>
-            <a:pPr eaLnBrk="1" hangingPunct="1"/>
-            <a:fld id="{BDD803A3-9453-1A47-9DE6-8AB671CE6B4E}" type="datetime1">
-              <a:rPr lang="en-US">
-                <a:latin typeface="Garamond" charset="0"/>
-              </a:rPr>
-              <a:pPr eaLnBrk="1" hangingPunct="1"/>
-              <a:t>9/16/15</a:t>
-            </a:fld>
-            <a:endParaRPr lang="en-US">
-              <a:latin typeface="Garamond" charset="0"/>
-            </a:endParaRPr>
-          </a:p>
-        </p:txBody>
-      </p:sp>
-      <p:sp>
-        <p:nvSpPr>
-          <p:cNvPr id="5" name="Footer Placeholder 4"/>
-          <p:cNvSpPr>
-            <a:spLocks noGrp="1"/>
-          </p:cNvSpPr>
-          <p:nvPr>
-            <p:ph type="ftr" sz="quarter" idx="11"/>
-          </p:nvPr>
-        </p:nvSpPr>
-        <p:spPr/>
-        <p:txBody>
-          <a:bodyPr/>
-          <a:lstStyle/>
-          <a:p>
-            <a:pPr>
-              <a:defRPr/>
-            </a:pPr>
-            <a:r>
-              <a:rPr lang="en-US" altLang="en-US"/>
-              <a:t>Microprocessors I:  Lecture 6</a:t>
-            </a:r>
-          </a:p>
-        </p:txBody>
-      </p:sp>
-      <p:sp>
-        <p:nvSpPr>
-          <p:cNvPr id="6" name="Slide Number Placeholder 5"/>
-          <p:cNvSpPr>
-            <a:spLocks noGrp="1"/>
-          </p:cNvSpPr>
-          <p:nvPr>
-            <p:ph type="sldNum" sz="quarter" idx="12"/>
-          </p:nvPr>
-        </p:nvSpPr>
-        <p:spPr/>
-        <p:txBody>
-          <a:bodyPr/>
-          <a:lstStyle>
-            <a:lvl1pPr eaLnBrk="0" hangingPunct="0">
-              <a:defRPr>
-                <a:solidFill>
-                  <a:schemeClr val="tx1"/>
-                </a:solidFill>
-                <a:latin typeface="Arial" charset="0"/>
-                <a:ea typeface="ＭＳ Ｐゴシック" charset="0"/>
-                <a:cs typeface="Arial" charset="0"/>
-              </a:defRPr>
-            </a:lvl1pPr>
-            <a:lvl2pPr marL="742950" indent="-285750" eaLnBrk="0" hangingPunct="0">
-              <a:defRPr>
-                <a:solidFill>
-                  <a:schemeClr val="tx1"/>
-                </a:solidFill>
-                <a:latin typeface="Arial" charset="0"/>
-                <a:ea typeface="Arial" charset="0"/>
-                <a:cs typeface="Arial" charset="0"/>
-              </a:defRPr>
-            </a:lvl2pPr>
-            <a:lvl3pPr marL="1143000" indent="-228600" eaLnBrk="0" hangingPunct="0">
-              <a:defRPr>
-                <a:solidFill>
-                  <a:schemeClr val="tx1"/>
-                </a:solidFill>
-                <a:latin typeface="Arial" charset="0"/>
-                <a:ea typeface="Arial" charset="0"/>
-                <a:cs typeface="Arial" charset="0"/>
-              </a:defRPr>
-            </a:lvl3pPr>
-            <a:lvl4pPr marL="1600200" indent="-228600" eaLnBrk="0" hangingPunct="0">
-              <a:defRPr>
-                <a:solidFill>
-                  <a:schemeClr val="tx1"/>
-                </a:solidFill>
-                <a:latin typeface="Arial" charset="0"/>
-                <a:ea typeface="Arial" charset="0"/>
-                <a:cs typeface="Arial" charset="0"/>
-              </a:defRPr>
-            </a:lvl4pPr>
-            <a:lvl5pPr marL="2057400" indent="-228600" eaLnBrk="0" hangingPunct="0">
-              <a:defRPr>
-                <a:solidFill>
-                  <a:schemeClr val="tx1"/>
-                </a:solidFill>
-                <a:latin typeface="Arial" charset="0"/>
-                <a:ea typeface="Arial" charset="0"/>
-                <a:cs typeface="Arial" charset="0"/>
-              </a:defRPr>
-            </a:lvl5pPr>
-            <a:lvl6pPr marL="2514600" indent="-228600" eaLnBrk="0" fontAlgn="base" hangingPunct="0">
-              <a:spcBef>
-                <a:spcPct val="0"/>
-              </a:spcBef>
-              <a:spcAft>
-                <a:spcPct val="0"/>
-              </a:spcAft>
-              <a:defRPr>
-                <a:solidFill>
-                  <a:schemeClr val="tx1"/>
-                </a:solidFill>
-                <a:latin typeface="Arial" charset="0"/>
-                <a:ea typeface="Arial" charset="0"/>
-                <a:cs typeface="Arial" charset="0"/>
-              </a:defRPr>
-            </a:lvl6pPr>
-            <a:lvl7pPr marL="2971800" indent="-228600" eaLnBrk="0" fontAlgn="base" hangingPunct="0">
-              <a:spcBef>
-                <a:spcPct val="0"/>
-              </a:spcBef>
-              <a:spcAft>
-                <a:spcPct val="0"/>
-              </a:spcAft>
-              <a:defRPr>
-                <a:solidFill>
-                  <a:schemeClr val="tx1"/>
-                </a:solidFill>
-                <a:latin typeface="Arial" charset="0"/>
-                <a:ea typeface="Arial" charset="0"/>
-                <a:cs typeface="Arial" charset="0"/>
-              </a:defRPr>
-            </a:lvl7pPr>
-            <a:lvl8pPr marL="3429000" indent="-228600" eaLnBrk="0" fontAlgn="base" hangingPunct="0">
-              <a:spcBef>
-                <a:spcPct val="0"/>
-              </a:spcBef>
-              <a:spcAft>
-                <a:spcPct val="0"/>
-              </a:spcAft>
-              <a:defRPr>
-                <a:solidFill>
-                  <a:schemeClr val="tx1"/>
-                </a:solidFill>
-                <a:latin typeface="Arial" charset="0"/>
-                <a:ea typeface="Arial" charset="0"/>
-                <a:cs typeface="Arial" charset="0"/>
-              </a:defRPr>
-            </a:lvl8pPr>
-            <a:lvl9pPr marL="3886200" indent="-228600" eaLnBrk="0" fontAlgn="base" hangingPunct="0">
-              <a:spcBef>
-                <a:spcPct val="0"/>
-              </a:spcBef>
-              <a:spcAft>
-                <a:spcPct val="0"/>
-              </a:spcAft>
-              <a:defRPr>
-                <a:solidFill>
-                  <a:schemeClr val="tx1"/>
-                </a:solidFill>
-                <a:latin typeface="Arial" charset="0"/>
-                <a:ea typeface="Arial" charset="0"/>
-                <a:cs typeface="Arial" charset="0"/>
-              </a:defRPr>
-            </a:lvl9pPr>
-          </a:lstStyle>
-          <a:p>
-            <a:pPr eaLnBrk="1" hangingPunct="1"/>
-            <a:fld id="{7B95B21D-3F62-994A-BA51-8550E1920094}" type="slidenum">
-              <a:rPr lang="en-US">
-                <a:latin typeface="Garamond" charset="0"/>
-              </a:rPr>
-              <a:pPr eaLnBrk="1" hangingPunct="1"/>
-              <a:t>13</a:t>
-            </a:fld>
-            <a:endParaRPr lang="en-US">
-              <a:latin typeface="Garamond" charset="0"/>
-            </a:endParaRPr>
-          </a:p>
-        </p:txBody>
-      </p:sp>
-    </p:spTree>
-    <p:extLst>
-      <p:ext uri="{BB962C8B-B14F-4D97-AF65-F5344CB8AC3E}">
-        <p14:creationId xmlns:p14="http://schemas.microsoft.com/office/powerpoint/2010/main" val="4467882"/>
-      </p:ext>
-    </p:extLst>
-  </p:cSld>
-  <p:clrMapOvr>
-    <a:masterClrMapping/>
-  </p:clrMapOvr>
-  <p:timing>
-    <p:tnLst>
-      <p:par>
-        <p:cTn xmlns:p14="http://schemas.microsoft.com/office/powerpoint/2010/main" id="1" dur="indefinite" restart="never" nodeType="tmRoot"/>
-      </p:par>
-    </p:tnLst>
-  </p:timing>
-</p:sld>
-</file>
-
-<file path=ppt/slides/slide14.xml><?xml version="1.0" encoding="utf-8"?>
-<p:sld xmlns:a="http://schemas.openxmlformats.org/drawingml/2006/main" xmlns:r="http://schemas.openxmlformats.org/officeDocument/2006/relationships" xmlns:p="http://schemas.openxmlformats.org/presentationml/2006/main">
-  <p:cSld>
-    <p:spTree>
-      <p:nvGrpSpPr>
-        <p:cNvPr id="1" name=""/>
-        <p:cNvGrpSpPr/>
-        <p:nvPr/>
-      </p:nvGrpSpPr>
-      <p:grpSpPr>
-        <a:xfrm>
-          <a:off x="0" y="0"/>
-          <a:ext cx="0" cy="0"/>
-          <a:chOff x="0" y="0"/>
-          <a:chExt cx="0" cy="0"/>
-        </a:xfrm>
-      </p:grpSpPr>
-      <p:sp>
-        <p:nvSpPr>
-          <p:cNvPr id="12290" name="Title 1"/>
-          <p:cNvSpPr>
-            <a:spLocks noGrp="1"/>
-          </p:cNvSpPr>
-          <p:nvPr>
-            <p:ph type="title"/>
-          </p:nvPr>
-        </p:nvSpPr>
-        <p:spPr/>
-        <p:txBody>
-          <a:bodyPr/>
-          <a:lstStyle/>
-          <a:p>
-            <a:r>
-              <a:rPr lang="en-US">
-                <a:latin typeface="Garamond" charset="0"/>
-              </a:rPr>
-              <a:t>Solution (continued)</a:t>
-            </a:r>
-          </a:p>
-        </p:txBody>
-      </p:sp>
-      <p:sp>
-        <p:nvSpPr>
-          <p:cNvPr id="3" name="Content Placeholder 2"/>
-          <p:cNvSpPr>
-            <a:spLocks noGrp="1"/>
-          </p:cNvSpPr>
-          <p:nvPr>
-            <p:ph idx="1"/>
-          </p:nvPr>
-        </p:nvSpPr>
-        <p:spPr/>
-        <p:txBody>
-          <a:bodyPr>
-            <a:normAutofit fontScale="85000" lnSpcReduction="20000"/>
-          </a:bodyPr>
-          <a:lstStyle/>
-          <a:p>
-            <a:pPr>
-              <a:buFont typeface="Wingdings" pitchFamily="2" charset="2"/>
-              <a:buChar char="n"/>
-              <a:defRPr/>
-            </a:pPr>
-            <a:r>
-              <a:rPr lang="en-US" dirty="0" smtClean="0">
-                <a:solidFill>
-                  <a:srgbClr val="FF0000"/>
-                </a:solidFill>
-                <a:ea typeface="+mn-ea"/>
-              </a:rPr>
-              <a:t>Consider that BH = </a:t>
-            </a:r>
-            <a:r>
-              <a:rPr lang="en-US" dirty="0" err="1" smtClean="0">
-                <a:solidFill>
-                  <a:srgbClr val="FF0000"/>
-                </a:solidFill>
-                <a:ea typeface="+mn-ea"/>
-              </a:rPr>
-              <a:t>FFh</a:t>
-            </a:r>
-            <a:r>
-              <a:rPr lang="en-US" dirty="0" smtClean="0">
-                <a:solidFill>
-                  <a:srgbClr val="FF0000"/>
-                </a:solidFill>
-                <a:ea typeface="+mn-ea"/>
-              </a:rPr>
-              <a:t> = 1111 1111</a:t>
-            </a:r>
-            <a:r>
-              <a:rPr lang="en-US" baseline="-25000" dirty="0" smtClean="0">
-                <a:solidFill>
-                  <a:srgbClr val="FF0000"/>
-                </a:solidFill>
-                <a:ea typeface="+mn-ea"/>
-              </a:rPr>
-              <a:t>2</a:t>
-            </a:r>
-            <a:endParaRPr lang="en-US" dirty="0" smtClean="0">
-              <a:solidFill>
-                <a:srgbClr val="FF0000"/>
-              </a:solidFill>
-              <a:ea typeface="+mn-ea"/>
-            </a:endParaRPr>
-          </a:p>
-          <a:p>
-            <a:pPr lvl="1">
-              <a:buFont typeface="Wingdings" pitchFamily="2" charset="2"/>
-              <a:buChar char="q"/>
-              <a:defRPr/>
-            </a:pPr>
-            <a:r>
-              <a:rPr lang="en-US" dirty="0" smtClean="0">
-                <a:solidFill>
-                  <a:srgbClr val="FF0000"/>
-                </a:solidFill>
-              </a:rPr>
-              <a:t>As unsigned value, </a:t>
-            </a:r>
-            <a:r>
-              <a:rPr lang="en-US" dirty="0" err="1" smtClean="0">
-                <a:solidFill>
-                  <a:srgbClr val="FF0000"/>
-                </a:solidFill>
-              </a:rPr>
-              <a:t>FFh</a:t>
-            </a:r>
-            <a:r>
-              <a:rPr lang="en-US" dirty="0" smtClean="0">
-                <a:solidFill>
-                  <a:srgbClr val="FF0000"/>
-                </a:solidFill>
-              </a:rPr>
-              <a:t> = 255</a:t>
-            </a:r>
-            <a:r>
-              <a:rPr lang="en-US" baseline="-25000" dirty="0" smtClean="0">
-                <a:solidFill>
-                  <a:srgbClr val="FF0000"/>
-                </a:solidFill>
-              </a:rPr>
-              <a:t>10</a:t>
-            </a:r>
-            <a:endParaRPr lang="en-US" dirty="0" smtClean="0">
-              <a:solidFill>
-                <a:srgbClr val="FF0000"/>
-              </a:solidFill>
-            </a:endParaRPr>
-          </a:p>
-          <a:p>
-            <a:pPr lvl="1">
-              <a:buFont typeface="Wingdings" pitchFamily="2" charset="2"/>
-              <a:buChar char="q"/>
-              <a:defRPr/>
-            </a:pPr>
-            <a:r>
-              <a:rPr lang="en-US" dirty="0" smtClean="0">
-                <a:solidFill>
-                  <a:srgbClr val="FF0000"/>
-                </a:solidFill>
-              </a:rPr>
-              <a:t>As signed value, </a:t>
-            </a:r>
-            <a:r>
-              <a:rPr lang="en-US" dirty="0" err="1" smtClean="0">
-                <a:solidFill>
-                  <a:srgbClr val="FF0000"/>
-                </a:solidFill>
-              </a:rPr>
-              <a:t>FFh</a:t>
-            </a:r>
-            <a:r>
-              <a:rPr lang="en-US" dirty="0" smtClean="0">
-                <a:solidFill>
-                  <a:srgbClr val="FF0000"/>
-                </a:solidFill>
-              </a:rPr>
-              <a:t> = -1</a:t>
-            </a:r>
-            <a:r>
-              <a:rPr lang="en-US" baseline="-25000" dirty="0" smtClean="0">
-                <a:solidFill>
-                  <a:srgbClr val="FF0000"/>
-                </a:solidFill>
-              </a:rPr>
-              <a:t>10</a:t>
-            </a:r>
-            <a:endParaRPr lang="en-US" dirty="0" smtClean="0">
-              <a:solidFill>
-                <a:srgbClr val="FF0000"/>
-              </a:solidFill>
-            </a:endParaRPr>
-          </a:p>
-          <a:p>
-            <a:pPr>
-              <a:buFont typeface="Wingdings" pitchFamily="2" charset="2"/>
-              <a:buChar char="n"/>
-              <a:defRPr/>
-            </a:pPr>
-            <a:r>
-              <a:rPr lang="en-US" dirty="0" smtClean="0">
-                <a:solidFill>
-                  <a:srgbClr val="FF0000"/>
-                </a:solidFill>
-                <a:ea typeface="+mn-ea"/>
-              </a:rPr>
-              <a:t>DIV	BL</a:t>
-            </a:r>
-          </a:p>
-          <a:p>
-            <a:pPr lvl="1">
-              <a:buFont typeface="Wingdings" pitchFamily="2" charset="2"/>
-              <a:buChar char="q"/>
-              <a:defRPr/>
-            </a:pPr>
-            <a:r>
-              <a:rPr lang="en-US" dirty="0" smtClean="0">
-                <a:solidFill>
-                  <a:srgbClr val="FF0000"/>
-                </a:solidFill>
-              </a:rPr>
-              <a:t>AL = AX / BL = 0005h </a:t>
-            </a:r>
-            <a:r>
-              <a:rPr lang="en-US" dirty="0">
-                <a:solidFill>
-                  <a:srgbClr val="FF0000"/>
-                </a:solidFill>
-              </a:rPr>
-              <a:t>/</a:t>
-            </a:r>
-            <a:r>
-              <a:rPr lang="en-US" dirty="0" smtClean="0">
-                <a:solidFill>
-                  <a:srgbClr val="FF0000"/>
-                </a:solidFill>
-              </a:rPr>
-              <a:t> 02h = 5 / 2 = </a:t>
-            </a:r>
-            <a:r>
-              <a:rPr lang="en-US" b="1" u="sng" dirty="0" smtClean="0">
-                <a:solidFill>
-                  <a:srgbClr val="FF0000"/>
-                </a:solidFill>
-              </a:rPr>
-              <a:t>02h</a:t>
-            </a:r>
-            <a:endParaRPr lang="en-US" dirty="0" smtClean="0">
-              <a:solidFill>
-                <a:srgbClr val="FF0000"/>
-              </a:solidFill>
-            </a:endParaRPr>
-          </a:p>
-          <a:p>
-            <a:pPr lvl="1">
-              <a:buFont typeface="Wingdings" pitchFamily="2" charset="2"/>
-              <a:buChar char="q"/>
-              <a:defRPr/>
-            </a:pPr>
-            <a:r>
-              <a:rPr lang="en-US" dirty="0" smtClean="0">
-                <a:solidFill>
-                  <a:srgbClr val="FF0000"/>
-                </a:solidFill>
-              </a:rPr>
-              <a:t>AH = AX % BL = 0005h % 02h = 5 % 2 = </a:t>
-            </a:r>
-            <a:r>
-              <a:rPr lang="en-US" b="1" u="sng" dirty="0" smtClean="0">
-                <a:solidFill>
-                  <a:srgbClr val="FF0000"/>
-                </a:solidFill>
-              </a:rPr>
-              <a:t>01h</a:t>
-            </a:r>
-            <a:endParaRPr lang="en-US" dirty="0" smtClean="0">
-              <a:solidFill>
-                <a:srgbClr val="FF0000"/>
-              </a:solidFill>
-            </a:endParaRPr>
-          </a:p>
-          <a:p>
-            <a:pPr>
-              <a:buFont typeface="Wingdings" pitchFamily="2" charset="2"/>
-              <a:buChar char="n"/>
-              <a:defRPr/>
-            </a:pPr>
-            <a:r>
-              <a:rPr lang="en-US" dirty="0" smtClean="0">
-                <a:solidFill>
-                  <a:srgbClr val="FF0000"/>
-                </a:solidFill>
-                <a:ea typeface="+mn-ea"/>
-              </a:rPr>
-              <a:t>DIV	BH</a:t>
-            </a:r>
-          </a:p>
-          <a:p>
-            <a:pPr lvl="1">
-              <a:buFont typeface="Wingdings" pitchFamily="2" charset="2"/>
-              <a:buChar char="q"/>
-              <a:defRPr/>
-            </a:pPr>
-            <a:r>
-              <a:rPr lang="en-US" dirty="0" smtClean="0">
-                <a:solidFill>
-                  <a:srgbClr val="FF0000"/>
-                </a:solidFill>
-              </a:rPr>
-              <a:t>Unsigned division</a:t>
-            </a:r>
-          </a:p>
-          <a:p>
-            <a:pPr lvl="1">
-              <a:buFont typeface="Wingdings" pitchFamily="2" charset="2"/>
-              <a:buChar char="q"/>
-              <a:defRPr/>
-            </a:pPr>
-            <a:r>
-              <a:rPr lang="en-US" dirty="0" smtClean="0">
-                <a:solidFill>
-                  <a:srgbClr val="FF0000"/>
-                </a:solidFill>
-              </a:rPr>
-              <a:t>AL = AX / BH = 0005h / </a:t>
-            </a:r>
-            <a:r>
-              <a:rPr lang="en-US" dirty="0" err="1" smtClean="0">
-                <a:solidFill>
-                  <a:srgbClr val="FF0000"/>
-                </a:solidFill>
-              </a:rPr>
-              <a:t>FFh</a:t>
-            </a:r>
-            <a:r>
-              <a:rPr lang="en-US" dirty="0" smtClean="0">
-                <a:solidFill>
-                  <a:srgbClr val="FF0000"/>
-                </a:solidFill>
-              </a:rPr>
-              <a:t> = 5 / 255 = </a:t>
-            </a:r>
-            <a:r>
-              <a:rPr lang="en-US" b="1" u="sng" dirty="0" smtClean="0">
-                <a:solidFill>
-                  <a:srgbClr val="FF0000"/>
-                </a:solidFill>
-              </a:rPr>
-              <a:t>00h</a:t>
-            </a:r>
-          </a:p>
-          <a:p>
-            <a:pPr lvl="1">
-              <a:buFont typeface="Wingdings" pitchFamily="2" charset="2"/>
-              <a:buChar char="q"/>
-              <a:defRPr/>
-            </a:pPr>
-            <a:r>
-              <a:rPr lang="en-US" dirty="0" smtClean="0">
-                <a:solidFill>
-                  <a:srgbClr val="FF0000"/>
-                </a:solidFill>
-              </a:rPr>
-              <a:t>AH = AX % BH = 0005h / </a:t>
-            </a:r>
-            <a:r>
-              <a:rPr lang="en-US" dirty="0" err="1" smtClean="0">
-                <a:solidFill>
-                  <a:srgbClr val="FF0000"/>
-                </a:solidFill>
-              </a:rPr>
-              <a:t>FFh</a:t>
-            </a:r>
-            <a:r>
-              <a:rPr lang="en-US" dirty="0" smtClean="0">
-                <a:solidFill>
-                  <a:srgbClr val="FF0000"/>
-                </a:solidFill>
-              </a:rPr>
-              <a:t> = 5 % 255 = </a:t>
-            </a:r>
-            <a:r>
-              <a:rPr lang="en-US" b="1" u="sng" dirty="0" smtClean="0">
-                <a:solidFill>
-                  <a:srgbClr val="FF0000"/>
-                </a:solidFill>
-              </a:rPr>
-              <a:t>05h</a:t>
-            </a:r>
-            <a:endParaRPr lang="en-US" dirty="0" smtClean="0">
-              <a:solidFill>
-                <a:srgbClr val="FF0000"/>
-              </a:solidFill>
-            </a:endParaRPr>
-          </a:p>
-          <a:p>
-            <a:pPr>
-              <a:buFont typeface="Wingdings" pitchFamily="2" charset="2"/>
-              <a:buChar char="n"/>
-              <a:defRPr/>
-            </a:pPr>
-            <a:r>
-              <a:rPr lang="en-US" dirty="0" smtClean="0">
-                <a:solidFill>
-                  <a:srgbClr val="FF0000"/>
-                </a:solidFill>
-                <a:ea typeface="+mn-ea"/>
-              </a:rPr>
-              <a:t>IDIV	BH</a:t>
-            </a:r>
-          </a:p>
-          <a:p>
-            <a:pPr lvl="1">
-              <a:buFont typeface="Wingdings" pitchFamily="2" charset="2"/>
-              <a:buChar char="q"/>
-              <a:defRPr/>
-            </a:pPr>
-            <a:r>
-              <a:rPr lang="en-US" dirty="0" smtClean="0">
-                <a:solidFill>
-                  <a:srgbClr val="FF0000"/>
-                </a:solidFill>
-              </a:rPr>
-              <a:t>Signed division</a:t>
-            </a:r>
-          </a:p>
-          <a:p>
-            <a:pPr lvl="1">
-              <a:buFont typeface="Wingdings" pitchFamily="2" charset="2"/>
-              <a:buChar char="q"/>
-              <a:defRPr/>
-            </a:pPr>
-            <a:r>
-              <a:rPr lang="en-US" dirty="0" smtClean="0">
-                <a:solidFill>
-                  <a:srgbClr val="FF0000"/>
-                </a:solidFill>
-              </a:rPr>
-              <a:t>AL = AX / BH = 0005h / </a:t>
-            </a:r>
-            <a:r>
-              <a:rPr lang="en-US" dirty="0" err="1" smtClean="0">
-                <a:solidFill>
-                  <a:srgbClr val="FF0000"/>
-                </a:solidFill>
-              </a:rPr>
-              <a:t>FFh</a:t>
-            </a:r>
-            <a:r>
-              <a:rPr lang="en-US" dirty="0" smtClean="0">
-                <a:solidFill>
-                  <a:srgbClr val="FF0000"/>
-                </a:solidFill>
-              </a:rPr>
-              <a:t> = 5 / -1 = -5 = </a:t>
-            </a:r>
-            <a:r>
-              <a:rPr lang="en-US" b="1" u="sng" dirty="0" err="1" smtClean="0">
-                <a:solidFill>
-                  <a:srgbClr val="FF0000"/>
-                </a:solidFill>
-              </a:rPr>
-              <a:t>FBh</a:t>
-            </a:r>
-            <a:endParaRPr lang="en-US" b="1" u="sng" dirty="0" smtClean="0">
-              <a:solidFill>
-                <a:srgbClr val="FF0000"/>
-              </a:solidFill>
-            </a:endParaRPr>
-          </a:p>
-          <a:p>
-            <a:pPr lvl="1">
-              <a:buFont typeface="Wingdings" pitchFamily="2" charset="2"/>
-              <a:buChar char="q"/>
-              <a:defRPr/>
-            </a:pPr>
-            <a:r>
-              <a:rPr lang="en-US" dirty="0" smtClean="0">
-                <a:solidFill>
-                  <a:srgbClr val="FF0000"/>
-                </a:solidFill>
-              </a:rPr>
-              <a:t>AH = AX % BH = 0005h % </a:t>
-            </a:r>
-            <a:r>
-              <a:rPr lang="en-US" dirty="0" err="1" smtClean="0">
-                <a:solidFill>
-                  <a:srgbClr val="FF0000"/>
-                </a:solidFill>
-              </a:rPr>
-              <a:t>FFh</a:t>
-            </a:r>
-            <a:r>
-              <a:rPr lang="en-US" dirty="0" smtClean="0">
-                <a:solidFill>
-                  <a:srgbClr val="FF0000"/>
-                </a:solidFill>
-              </a:rPr>
-              <a:t> = 5 % -1 = </a:t>
-            </a:r>
-            <a:r>
-              <a:rPr lang="en-US" b="1" u="sng" dirty="0" smtClean="0">
-                <a:solidFill>
-                  <a:srgbClr val="FF0000"/>
-                </a:solidFill>
-              </a:rPr>
-              <a:t>00h</a:t>
-            </a:r>
-            <a:endParaRPr lang="en-US" dirty="0" smtClean="0">
-              <a:solidFill>
-                <a:srgbClr val="FF0000"/>
-              </a:solidFill>
-            </a:endParaRPr>
-          </a:p>
-        </p:txBody>
-      </p:sp>
-      <p:sp>
-        <p:nvSpPr>
-          <p:cNvPr id="4" name="Date Placeholder 3"/>
-          <p:cNvSpPr>
-            <a:spLocks noGrp="1"/>
-          </p:cNvSpPr>
-          <p:nvPr>
-            <p:ph type="dt" sz="quarter" idx="10"/>
-          </p:nvPr>
-        </p:nvSpPr>
-        <p:spPr/>
-        <p:txBody>
-          <a:bodyPr/>
-          <a:lstStyle>
-            <a:lvl1pPr eaLnBrk="0" hangingPunct="0">
-              <a:defRPr>
-                <a:solidFill>
-                  <a:schemeClr val="tx1"/>
-                </a:solidFill>
-                <a:latin typeface="Arial" charset="0"/>
-                <a:ea typeface="ＭＳ Ｐゴシック" charset="0"/>
-                <a:cs typeface="Arial" charset="0"/>
-              </a:defRPr>
-            </a:lvl1pPr>
-            <a:lvl2pPr marL="742950" indent="-285750" eaLnBrk="0" hangingPunct="0">
-              <a:defRPr>
-                <a:solidFill>
-                  <a:schemeClr val="tx1"/>
-                </a:solidFill>
-                <a:latin typeface="Arial" charset="0"/>
-                <a:ea typeface="Arial" charset="0"/>
-                <a:cs typeface="Arial" charset="0"/>
-              </a:defRPr>
-            </a:lvl2pPr>
-            <a:lvl3pPr marL="1143000" indent="-228600" eaLnBrk="0" hangingPunct="0">
-              <a:defRPr>
-                <a:solidFill>
-                  <a:schemeClr val="tx1"/>
-                </a:solidFill>
-                <a:latin typeface="Arial" charset="0"/>
-                <a:ea typeface="Arial" charset="0"/>
-                <a:cs typeface="Arial" charset="0"/>
-              </a:defRPr>
-            </a:lvl3pPr>
-            <a:lvl4pPr marL="1600200" indent="-228600" eaLnBrk="0" hangingPunct="0">
-              <a:defRPr>
-                <a:solidFill>
-                  <a:schemeClr val="tx1"/>
-                </a:solidFill>
-                <a:latin typeface="Arial" charset="0"/>
-                <a:ea typeface="Arial" charset="0"/>
-                <a:cs typeface="Arial" charset="0"/>
-              </a:defRPr>
-            </a:lvl4pPr>
-            <a:lvl5pPr marL="2057400" indent="-228600" eaLnBrk="0" hangingPunct="0">
-              <a:defRPr>
-                <a:solidFill>
-                  <a:schemeClr val="tx1"/>
-                </a:solidFill>
-                <a:latin typeface="Arial" charset="0"/>
-                <a:ea typeface="Arial" charset="0"/>
-                <a:cs typeface="Arial" charset="0"/>
-              </a:defRPr>
-            </a:lvl5pPr>
-            <a:lvl6pPr marL="2514600" indent="-228600" eaLnBrk="0" fontAlgn="base" hangingPunct="0">
-              <a:spcBef>
-                <a:spcPct val="0"/>
-              </a:spcBef>
-              <a:spcAft>
-                <a:spcPct val="0"/>
-              </a:spcAft>
-              <a:defRPr>
-                <a:solidFill>
-                  <a:schemeClr val="tx1"/>
-                </a:solidFill>
-                <a:latin typeface="Arial" charset="0"/>
-                <a:ea typeface="Arial" charset="0"/>
-                <a:cs typeface="Arial" charset="0"/>
-              </a:defRPr>
-            </a:lvl6pPr>
-            <a:lvl7pPr marL="2971800" indent="-228600" eaLnBrk="0" fontAlgn="base" hangingPunct="0">
-              <a:spcBef>
-                <a:spcPct val="0"/>
-              </a:spcBef>
-              <a:spcAft>
-                <a:spcPct val="0"/>
-              </a:spcAft>
-              <a:defRPr>
-                <a:solidFill>
-                  <a:schemeClr val="tx1"/>
-                </a:solidFill>
-                <a:latin typeface="Arial" charset="0"/>
-                <a:ea typeface="Arial" charset="0"/>
-                <a:cs typeface="Arial" charset="0"/>
-              </a:defRPr>
-            </a:lvl7pPr>
-            <a:lvl8pPr marL="3429000" indent="-228600" eaLnBrk="0" fontAlgn="base" hangingPunct="0">
-              <a:spcBef>
-                <a:spcPct val="0"/>
-              </a:spcBef>
-              <a:spcAft>
-                <a:spcPct val="0"/>
-              </a:spcAft>
-              <a:defRPr>
-                <a:solidFill>
-                  <a:schemeClr val="tx1"/>
-                </a:solidFill>
-                <a:latin typeface="Arial" charset="0"/>
-                <a:ea typeface="Arial" charset="0"/>
-                <a:cs typeface="Arial" charset="0"/>
-              </a:defRPr>
-            </a:lvl8pPr>
-            <a:lvl9pPr marL="3886200" indent="-228600" eaLnBrk="0" fontAlgn="base" hangingPunct="0">
-              <a:spcBef>
-                <a:spcPct val="0"/>
-              </a:spcBef>
-              <a:spcAft>
-                <a:spcPct val="0"/>
-              </a:spcAft>
-              <a:defRPr>
-                <a:solidFill>
-                  <a:schemeClr val="tx1"/>
-                </a:solidFill>
-                <a:latin typeface="Arial" charset="0"/>
-                <a:ea typeface="Arial" charset="0"/>
-                <a:cs typeface="Arial" charset="0"/>
-              </a:defRPr>
-            </a:lvl9pPr>
-          </a:lstStyle>
-          <a:p>
-            <a:pPr eaLnBrk="1" hangingPunct="1"/>
-            <a:fld id="{64978967-6212-E14B-9AC9-0A87396CF254}" type="datetime1">
-              <a:rPr lang="en-US">
-                <a:latin typeface="Garamond" charset="0"/>
-              </a:rPr>
-              <a:pPr eaLnBrk="1" hangingPunct="1"/>
-              <a:t>9/16/15</a:t>
-            </a:fld>
-            <a:endParaRPr lang="en-US">
-              <a:latin typeface="Garamond" charset="0"/>
-            </a:endParaRPr>
-          </a:p>
-        </p:txBody>
-      </p:sp>
-      <p:sp>
-        <p:nvSpPr>
-          <p:cNvPr id="5" name="Footer Placeholder 4"/>
-          <p:cNvSpPr>
-            <a:spLocks noGrp="1"/>
-          </p:cNvSpPr>
-          <p:nvPr>
-            <p:ph type="ftr" sz="quarter" idx="11"/>
-          </p:nvPr>
-        </p:nvSpPr>
-        <p:spPr/>
-        <p:txBody>
-          <a:bodyPr/>
-          <a:lstStyle/>
-          <a:p>
-            <a:pPr>
-              <a:defRPr/>
-            </a:pPr>
-            <a:r>
-              <a:rPr lang="en-US" altLang="en-US"/>
-              <a:t>Microprocessors I:  Lecture 6</a:t>
-            </a:r>
-          </a:p>
-        </p:txBody>
-      </p:sp>
-      <p:sp>
-        <p:nvSpPr>
-          <p:cNvPr id="6" name="Slide Number Placeholder 5"/>
-          <p:cNvSpPr>
-            <a:spLocks noGrp="1"/>
-          </p:cNvSpPr>
-          <p:nvPr>
-            <p:ph type="sldNum" sz="quarter" idx="12"/>
-          </p:nvPr>
-        </p:nvSpPr>
-        <p:spPr/>
-        <p:txBody>
-          <a:bodyPr/>
-          <a:lstStyle>
-            <a:lvl1pPr eaLnBrk="0" hangingPunct="0">
-              <a:defRPr>
-                <a:solidFill>
-                  <a:schemeClr val="tx1"/>
-                </a:solidFill>
-                <a:latin typeface="Arial" charset="0"/>
-                <a:ea typeface="ＭＳ Ｐゴシック" charset="0"/>
-                <a:cs typeface="Arial" charset="0"/>
-              </a:defRPr>
-            </a:lvl1pPr>
-            <a:lvl2pPr marL="742950" indent="-285750" eaLnBrk="0" hangingPunct="0">
-              <a:defRPr>
-                <a:solidFill>
-                  <a:schemeClr val="tx1"/>
-                </a:solidFill>
-                <a:latin typeface="Arial" charset="0"/>
-                <a:ea typeface="Arial" charset="0"/>
-                <a:cs typeface="Arial" charset="0"/>
-              </a:defRPr>
-            </a:lvl2pPr>
-            <a:lvl3pPr marL="1143000" indent="-228600" eaLnBrk="0" hangingPunct="0">
-              <a:defRPr>
-                <a:solidFill>
-                  <a:schemeClr val="tx1"/>
-                </a:solidFill>
-                <a:latin typeface="Arial" charset="0"/>
-                <a:ea typeface="Arial" charset="0"/>
-                <a:cs typeface="Arial" charset="0"/>
-              </a:defRPr>
-            </a:lvl3pPr>
-            <a:lvl4pPr marL="1600200" indent="-228600" eaLnBrk="0" hangingPunct="0">
-              <a:defRPr>
-                <a:solidFill>
-                  <a:schemeClr val="tx1"/>
-                </a:solidFill>
-                <a:latin typeface="Arial" charset="0"/>
-                <a:ea typeface="Arial" charset="0"/>
-                <a:cs typeface="Arial" charset="0"/>
-              </a:defRPr>
-            </a:lvl4pPr>
-            <a:lvl5pPr marL="2057400" indent="-228600" eaLnBrk="0" hangingPunct="0">
-              <a:defRPr>
-                <a:solidFill>
-                  <a:schemeClr val="tx1"/>
-                </a:solidFill>
-                <a:latin typeface="Arial" charset="0"/>
-                <a:ea typeface="Arial" charset="0"/>
-                <a:cs typeface="Arial" charset="0"/>
-              </a:defRPr>
-            </a:lvl5pPr>
-            <a:lvl6pPr marL="2514600" indent="-228600" eaLnBrk="0" fontAlgn="base" hangingPunct="0">
-              <a:spcBef>
-                <a:spcPct val="0"/>
-              </a:spcBef>
-              <a:spcAft>
-                <a:spcPct val="0"/>
-              </a:spcAft>
-              <a:defRPr>
-                <a:solidFill>
-                  <a:schemeClr val="tx1"/>
-                </a:solidFill>
-                <a:latin typeface="Arial" charset="0"/>
-                <a:ea typeface="Arial" charset="0"/>
-                <a:cs typeface="Arial" charset="0"/>
-              </a:defRPr>
-            </a:lvl6pPr>
-            <a:lvl7pPr marL="2971800" indent="-228600" eaLnBrk="0" fontAlgn="base" hangingPunct="0">
-              <a:spcBef>
-                <a:spcPct val="0"/>
-              </a:spcBef>
-              <a:spcAft>
-                <a:spcPct val="0"/>
-              </a:spcAft>
-              <a:defRPr>
-                <a:solidFill>
-                  <a:schemeClr val="tx1"/>
-                </a:solidFill>
-                <a:latin typeface="Arial" charset="0"/>
-                <a:ea typeface="Arial" charset="0"/>
-                <a:cs typeface="Arial" charset="0"/>
-              </a:defRPr>
-            </a:lvl7pPr>
-            <a:lvl8pPr marL="3429000" indent="-228600" eaLnBrk="0" fontAlgn="base" hangingPunct="0">
-              <a:spcBef>
-                <a:spcPct val="0"/>
-              </a:spcBef>
-              <a:spcAft>
-                <a:spcPct val="0"/>
-              </a:spcAft>
-              <a:defRPr>
-                <a:solidFill>
-                  <a:schemeClr val="tx1"/>
-                </a:solidFill>
-                <a:latin typeface="Arial" charset="0"/>
-                <a:ea typeface="Arial" charset="0"/>
-                <a:cs typeface="Arial" charset="0"/>
-              </a:defRPr>
-            </a:lvl8pPr>
-            <a:lvl9pPr marL="3886200" indent="-228600" eaLnBrk="0" fontAlgn="base" hangingPunct="0">
-              <a:spcBef>
-                <a:spcPct val="0"/>
-              </a:spcBef>
-              <a:spcAft>
-                <a:spcPct val="0"/>
-              </a:spcAft>
-              <a:defRPr>
-                <a:solidFill>
-                  <a:schemeClr val="tx1"/>
-                </a:solidFill>
-                <a:latin typeface="Arial" charset="0"/>
-                <a:ea typeface="Arial" charset="0"/>
-                <a:cs typeface="Arial" charset="0"/>
-              </a:defRPr>
-            </a:lvl9pPr>
-          </a:lstStyle>
-          <a:p>
-            <a:pPr eaLnBrk="1" hangingPunct="1"/>
-            <a:fld id="{A6EAC2ED-D4BA-C149-9F23-1DB07AE2C40A}" type="slidenum">
-              <a:rPr lang="en-US">
-                <a:latin typeface="Garamond" charset="0"/>
-              </a:rPr>
-              <a:pPr eaLnBrk="1" hangingPunct="1"/>
-              <a:t>14</a:t>
-            </a:fld>
-            <a:endParaRPr lang="en-US">
-              <a:latin typeface="Garamond" charset="0"/>
-            </a:endParaRPr>
-          </a:p>
-        </p:txBody>
-      </p:sp>
-    </p:spTree>
-    <p:extLst>
-      <p:ext uri="{BB962C8B-B14F-4D97-AF65-F5344CB8AC3E}">
-        <p14:creationId xmlns:p14="http://schemas.microsoft.com/office/powerpoint/2010/main" val="2901292473"/>
-      </p:ext>
-    </p:extLst>
-  </p:cSld>
-  <p:clrMapOvr>
-    <a:masterClrMapping/>
-  </p:clrMapOvr>
-  <p:timing>
-    <p:tnLst>
-      <p:par>
-        <p:cTn xmlns:p14="http://schemas.microsoft.com/office/powerpoint/2010/main" id="1" dur="indefinite" restart="never" nodeType="tmRoot"/>
-      </p:par>
-    </p:tnLst>
-  </p:timing>
-</p:sld>
-</file>
-
-<file path=ppt/slides/slide15.xml><?xml version="1.0" encoding="utf-8"?>
-<p:sld xmlns:a="http://schemas.openxmlformats.org/drawingml/2006/main" xmlns:r="http://schemas.openxmlformats.org/officeDocument/2006/relationships" xmlns:p="http://schemas.openxmlformats.org/presentationml/2006/main">
-  <p:cSld>
-    <p:spTree>
-      <p:nvGrpSpPr>
-        <p:cNvPr id="1" name=""/>
-        <p:cNvGrpSpPr/>
-        <p:nvPr/>
-      </p:nvGrpSpPr>
-      <p:grpSpPr>
-        <a:xfrm>
-          <a:off x="0" y="0"/>
-          <a:ext cx="0" cy="0"/>
-          <a:chOff x="0" y="0"/>
-          <a:chExt cx="0" cy="0"/>
-        </a:xfrm>
-      </p:grpSpPr>
-      <p:sp>
-        <p:nvSpPr>
-          <p:cNvPr id="19458" name="Title 1"/>
-          <p:cNvSpPr>
-            <a:spLocks noGrp="1"/>
-          </p:cNvSpPr>
-          <p:nvPr>
-            <p:ph type="title"/>
-          </p:nvPr>
-        </p:nvSpPr>
-        <p:spPr/>
-        <p:txBody>
-          <a:bodyPr/>
-          <a:lstStyle/>
-          <a:p>
-            <a:r>
-              <a:rPr lang="en-US">
-                <a:latin typeface="Garamond" charset="0"/>
-              </a:rPr>
-              <a:t>Final notes</a:t>
-            </a:r>
-          </a:p>
-        </p:txBody>
-      </p:sp>
-      <p:sp>
-        <p:nvSpPr>
-          <p:cNvPr id="19459" name="Content Placeholder 2"/>
-          <p:cNvSpPr>
-            <a:spLocks noGrp="1"/>
-          </p:cNvSpPr>
-          <p:nvPr>
-            <p:ph idx="1"/>
-          </p:nvPr>
-        </p:nvSpPr>
-        <p:spPr/>
-        <p:txBody>
-          <a:bodyPr/>
-          <a:lstStyle/>
-          <a:p>
-            <a:r>
-              <a:rPr lang="en-US" dirty="0">
-                <a:latin typeface="Arial" charset="0"/>
-              </a:rPr>
-              <a:t>Next time:</a:t>
-            </a:r>
-          </a:p>
-          <a:p>
-            <a:pPr lvl="1"/>
-            <a:r>
-              <a:rPr lang="en-US" dirty="0" smtClean="0">
-                <a:latin typeface="Arial" charset="0"/>
-              </a:rPr>
-              <a:t>Logical </a:t>
-            </a:r>
-            <a:r>
-              <a:rPr lang="en-US" dirty="0" smtClean="0">
-                <a:latin typeface="Arial" charset="0"/>
-              </a:rPr>
-              <a:t>and shift instructions</a:t>
-            </a:r>
-            <a:endParaRPr lang="en-US" dirty="0">
-              <a:latin typeface="Arial" charset="0"/>
-            </a:endParaRPr>
-          </a:p>
-          <a:p>
-            <a:r>
-              <a:rPr lang="en-US" dirty="0">
-                <a:latin typeface="Arial" charset="0"/>
-              </a:rPr>
-              <a:t>Reminders:</a:t>
-            </a:r>
-          </a:p>
-          <a:p>
-            <a:pPr lvl="1"/>
-            <a:r>
-              <a:rPr lang="en-US" dirty="0">
-                <a:latin typeface="Arial" charset="0"/>
-              </a:rPr>
-              <a:t>HW 1 due 2:00 PM today</a:t>
-            </a:r>
-          </a:p>
-          <a:p>
-            <a:pPr lvl="1"/>
-            <a:r>
-              <a:rPr lang="en-US" dirty="0">
-                <a:latin typeface="Arial" charset="0"/>
-              </a:rPr>
-              <a:t>HW 2 to be posted; due 2:00 </a:t>
-            </a:r>
-            <a:r>
-              <a:rPr lang="en-US" dirty="0" smtClean="0">
-                <a:latin typeface="Arial" charset="0"/>
-              </a:rPr>
-              <a:t>PM, </a:t>
-            </a:r>
-            <a:r>
-              <a:rPr lang="en-US" dirty="0">
-                <a:latin typeface="Arial" charset="0"/>
-              </a:rPr>
-              <a:t>9/25</a:t>
-            </a:r>
-          </a:p>
-          <a:p>
-            <a:pPr lvl="1"/>
-            <a:endParaRPr lang="en-US" dirty="0">
-              <a:latin typeface="Arial" charset="0"/>
-            </a:endParaRPr>
-          </a:p>
-        </p:txBody>
-      </p:sp>
-      <p:sp>
-        <p:nvSpPr>
-          <p:cNvPr id="4" name="Date Placeholder 3"/>
-          <p:cNvSpPr>
-            <a:spLocks noGrp="1"/>
-          </p:cNvSpPr>
-          <p:nvPr>
-            <p:ph type="dt" sz="quarter" idx="10"/>
-          </p:nvPr>
-        </p:nvSpPr>
-        <p:spPr/>
-        <p:txBody>
-          <a:bodyPr/>
-          <a:lstStyle>
-            <a:lvl1pPr eaLnBrk="0" hangingPunct="0">
-              <a:defRPr>
-                <a:solidFill>
-                  <a:schemeClr val="tx1"/>
-                </a:solidFill>
-                <a:latin typeface="Arial" charset="0"/>
-                <a:ea typeface="ＭＳ Ｐゴシック" charset="0"/>
-                <a:cs typeface="Arial" charset="0"/>
-              </a:defRPr>
-            </a:lvl1pPr>
-            <a:lvl2pPr marL="742950" indent="-285750" eaLnBrk="0" hangingPunct="0">
-              <a:defRPr>
-                <a:solidFill>
-                  <a:schemeClr val="tx1"/>
-                </a:solidFill>
-                <a:latin typeface="Arial" charset="0"/>
-                <a:ea typeface="Arial" charset="0"/>
-                <a:cs typeface="Arial" charset="0"/>
-              </a:defRPr>
-            </a:lvl2pPr>
-            <a:lvl3pPr marL="1143000" indent="-228600" eaLnBrk="0" hangingPunct="0">
-              <a:defRPr>
-                <a:solidFill>
-                  <a:schemeClr val="tx1"/>
-                </a:solidFill>
-                <a:latin typeface="Arial" charset="0"/>
-                <a:ea typeface="Arial" charset="0"/>
-                <a:cs typeface="Arial" charset="0"/>
-              </a:defRPr>
-            </a:lvl3pPr>
-            <a:lvl4pPr marL="1600200" indent="-228600" eaLnBrk="0" hangingPunct="0">
-              <a:defRPr>
-                <a:solidFill>
-                  <a:schemeClr val="tx1"/>
-                </a:solidFill>
-                <a:latin typeface="Arial" charset="0"/>
-                <a:ea typeface="Arial" charset="0"/>
-                <a:cs typeface="Arial" charset="0"/>
-              </a:defRPr>
-            </a:lvl4pPr>
-            <a:lvl5pPr marL="2057400" indent="-228600" eaLnBrk="0" hangingPunct="0">
-              <a:defRPr>
-                <a:solidFill>
-                  <a:schemeClr val="tx1"/>
-                </a:solidFill>
-                <a:latin typeface="Arial" charset="0"/>
-                <a:ea typeface="Arial" charset="0"/>
-                <a:cs typeface="Arial" charset="0"/>
-              </a:defRPr>
-            </a:lvl5pPr>
-            <a:lvl6pPr marL="2514600" indent="-228600" eaLnBrk="0" fontAlgn="base" hangingPunct="0">
-              <a:spcBef>
-                <a:spcPct val="0"/>
-              </a:spcBef>
-              <a:spcAft>
-                <a:spcPct val="0"/>
-              </a:spcAft>
-              <a:defRPr>
-                <a:solidFill>
-                  <a:schemeClr val="tx1"/>
-                </a:solidFill>
-                <a:latin typeface="Arial" charset="0"/>
-                <a:ea typeface="Arial" charset="0"/>
-                <a:cs typeface="Arial" charset="0"/>
-              </a:defRPr>
-            </a:lvl6pPr>
-            <a:lvl7pPr marL="2971800" indent="-228600" eaLnBrk="0" fontAlgn="base" hangingPunct="0">
-              <a:spcBef>
-                <a:spcPct val="0"/>
-              </a:spcBef>
-              <a:spcAft>
-                <a:spcPct val="0"/>
-              </a:spcAft>
-              <a:defRPr>
-                <a:solidFill>
-                  <a:schemeClr val="tx1"/>
-                </a:solidFill>
-                <a:latin typeface="Arial" charset="0"/>
-                <a:ea typeface="Arial" charset="0"/>
-                <a:cs typeface="Arial" charset="0"/>
-              </a:defRPr>
-            </a:lvl7pPr>
-            <a:lvl8pPr marL="3429000" indent="-228600" eaLnBrk="0" fontAlgn="base" hangingPunct="0">
-              <a:spcBef>
-                <a:spcPct val="0"/>
-              </a:spcBef>
-              <a:spcAft>
-                <a:spcPct val="0"/>
-              </a:spcAft>
-              <a:defRPr>
-                <a:solidFill>
-                  <a:schemeClr val="tx1"/>
-                </a:solidFill>
-                <a:latin typeface="Arial" charset="0"/>
-                <a:ea typeface="Arial" charset="0"/>
-                <a:cs typeface="Arial" charset="0"/>
-              </a:defRPr>
-            </a:lvl8pPr>
-            <a:lvl9pPr marL="3886200" indent="-228600" eaLnBrk="0" fontAlgn="base" hangingPunct="0">
-              <a:spcBef>
-                <a:spcPct val="0"/>
-              </a:spcBef>
-              <a:spcAft>
-                <a:spcPct val="0"/>
-              </a:spcAft>
-              <a:defRPr>
-                <a:solidFill>
-                  <a:schemeClr val="tx1"/>
-                </a:solidFill>
-                <a:latin typeface="Arial" charset="0"/>
-                <a:ea typeface="Arial" charset="0"/>
-                <a:cs typeface="Arial" charset="0"/>
-              </a:defRPr>
-            </a:lvl9pPr>
-          </a:lstStyle>
-          <a:p>
-            <a:pPr eaLnBrk="1" hangingPunct="1"/>
-            <a:fld id="{BF506E05-76E7-1D48-96AD-D1932997F0FE}" type="datetime1">
-              <a:rPr lang="en-US" smtClean="0">
-                <a:latin typeface="Garamond" charset="0"/>
-              </a:rPr>
-              <a:t>9/16/15</a:t>
-            </a:fld>
-            <a:endParaRPr lang="en-US">
-              <a:latin typeface="Garamond" charset="0"/>
-            </a:endParaRPr>
-          </a:p>
-        </p:txBody>
-      </p:sp>
-      <p:sp>
-        <p:nvSpPr>
-          <p:cNvPr id="5" name="Footer Placeholder 4"/>
-          <p:cNvSpPr>
-            <a:spLocks noGrp="1"/>
-          </p:cNvSpPr>
-          <p:nvPr>
-            <p:ph type="ftr" sz="quarter" idx="11"/>
-          </p:nvPr>
-        </p:nvSpPr>
-        <p:spPr/>
-        <p:txBody>
-          <a:bodyPr/>
-          <a:lstStyle/>
-          <a:p>
-            <a:pPr>
-              <a:defRPr/>
-            </a:pPr>
-            <a:r>
-              <a:rPr lang="en-US" altLang="en-US" smtClean="0"/>
-              <a:t>Microprocessors I:  Lecture 6</a:t>
-            </a:r>
-            <a:endParaRPr lang="en-US" altLang="en-US"/>
-          </a:p>
-        </p:txBody>
-      </p:sp>
-      <p:sp>
-        <p:nvSpPr>
-          <p:cNvPr id="6" name="Slide Number Placeholder 5"/>
-          <p:cNvSpPr>
-            <a:spLocks noGrp="1"/>
-          </p:cNvSpPr>
-          <p:nvPr>
-            <p:ph type="sldNum" sz="quarter" idx="12"/>
-          </p:nvPr>
-        </p:nvSpPr>
-        <p:spPr/>
-        <p:txBody>
-          <a:bodyPr/>
-          <a:lstStyle>
-            <a:lvl1pPr eaLnBrk="0" hangingPunct="0">
-              <a:defRPr>
-                <a:solidFill>
-                  <a:schemeClr val="tx1"/>
-                </a:solidFill>
-                <a:latin typeface="Arial" charset="0"/>
-                <a:ea typeface="ＭＳ Ｐゴシック" charset="0"/>
-                <a:cs typeface="Arial" charset="0"/>
-              </a:defRPr>
-            </a:lvl1pPr>
-            <a:lvl2pPr marL="742950" indent="-285750" eaLnBrk="0" hangingPunct="0">
-              <a:defRPr>
-                <a:solidFill>
-                  <a:schemeClr val="tx1"/>
-                </a:solidFill>
-                <a:latin typeface="Arial" charset="0"/>
-                <a:ea typeface="Arial" charset="0"/>
-                <a:cs typeface="Arial" charset="0"/>
-              </a:defRPr>
-            </a:lvl2pPr>
-            <a:lvl3pPr marL="1143000" indent="-228600" eaLnBrk="0" hangingPunct="0">
-              <a:defRPr>
-                <a:solidFill>
-                  <a:schemeClr val="tx1"/>
-                </a:solidFill>
-                <a:latin typeface="Arial" charset="0"/>
-                <a:ea typeface="Arial" charset="0"/>
-                <a:cs typeface="Arial" charset="0"/>
-              </a:defRPr>
-            </a:lvl3pPr>
-            <a:lvl4pPr marL="1600200" indent="-228600" eaLnBrk="0" hangingPunct="0">
-              <a:defRPr>
-                <a:solidFill>
-                  <a:schemeClr val="tx1"/>
-                </a:solidFill>
-                <a:latin typeface="Arial" charset="0"/>
-                <a:ea typeface="Arial" charset="0"/>
-                <a:cs typeface="Arial" charset="0"/>
-              </a:defRPr>
-            </a:lvl4pPr>
-            <a:lvl5pPr marL="2057400" indent="-228600" eaLnBrk="0" hangingPunct="0">
-              <a:defRPr>
-                <a:solidFill>
-                  <a:schemeClr val="tx1"/>
-                </a:solidFill>
-                <a:latin typeface="Arial" charset="0"/>
-                <a:ea typeface="Arial" charset="0"/>
-                <a:cs typeface="Arial" charset="0"/>
-              </a:defRPr>
-            </a:lvl5pPr>
-            <a:lvl6pPr marL="2514600" indent="-228600" eaLnBrk="0" fontAlgn="base" hangingPunct="0">
-              <a:spcBef>
-                <a:spcPct val="0"/>
-              </a:spcBef>
-              <a:spcAft>
-                <a:spcPct val="0"/>
-              </a:spcAft>
-              <a:defRPr>
-                <a:solidFill>
-                  <a:schemeClr val="tx1"/>
-                </a:solidFill>
-                <a:latin typeface="Arial" charset="0"/>
-                <a:ea typeface="Arial" charset="0"/>
-                <a:cs typeface="Arial" charset="0"/>
-              </a:defRPr>
-            </a:lvl6pPr>
-            <a:lvl7pPr marL="2971800" indent="-228600" eaLnBrk="0" fontAlgn="base" hangingPunct="0">
-              <a:spcBef>
-                <a:spcPct val="0"/>
-              </a:spcBef>
-              <a:spcAft>
-                <a:spcPct val="0"/>
-              </a:spcAft>
-              <a:defRPr>
-                <a:solidFill>
-                  <a:schemeClr val="tx1"/>
-                </a:solidFill>
-                <a:latin typeface="Arial" charset="0"/>
-                <a:ea typeface="Arial" charset="0"/>
-                <a:cs typeface="Arial" charset="0"/>
-              </a:defRPr>
-            </a:lvl7pPr>
-            <a:lvl8pPr marL="3429000" indent="-228600" eaLnBrk="0" fontAlgn="base" hangingPunct="0">
-              <a:spcBef>
-                <a:spcPct val="0"/>
-              </a:spcBef>
-              <a:spcAft>
-                <a:spcPct val="0"/>
-              </a:spcAft>
-              <a:defRPr>
-                <a:solidFill>
-                  <a:schemeClr val="tx1"/>
-                </a:solidFill>
-                <a:latin typeface="Arial" charset="0"/>
-                <a:ea typeface="Arial" charset="0"/>
-                <a:cs typeface="Arial" charset="0"/>
-              </a:defRPr>
-            </a:lvl8pPr>
-            <a:lvl9pPr marL="3886200" indent="-228600" eaLnBrk="0" fontAlgn="base" hangingPunct="0">
-              <a:spcBef>
-                <a:spcPct val="0"/>
-              </a:spcBef>
-              <a:spcAft>
-                <a:spcPct val="0"/>
-              </a:spcAft>
-              <a:defRPr>
-                <a:solidFill>
-                  <a:schemeClr val="tx1"/>
-                </a:solidFill>
-                <a:latin typeface="Arial" charset="0"/>
-                <a:ea typeface="Arial" charset="0"/>
-                <a:cs typeface="Arial" charset="0"/>
-              </a:defRPr>
-            </a:lvl9pPr>
-          </a:lstStyle>
-          <a:p>
-            <a:pPr eaLnBrk="1" hangingPunct="1"/>
-            <a:fld id="{7318A6F9-97BD-0640-AE56-DA2FF8060FFA}" type="slidenum">
-              <a:rPr lang="en-US">
-                <a:latin typeface="Garamond" charset="0"/>
-              </a:rPr>
-              <a:pPr eaLnBrk="1" hangingPunct="1"/>
-              <a:t>15</a:t>
-            </a:fld>
-            <a:endParaRPr lang="en-US">
-              <a:latin typeface="Garamond" charset="0"/>
             </a:endParaRPr>
           </a:p>
         </p:txBody>
@@ -9756,13 +6101,7 @@
               <a:rPr lang="en-US" dirty="0" smtClean="0">
                 <a:latin typeface="Arial" charset="0"/>
               </a:rPr>
-              <a:t>due 2:00 </a:t>
-            </a:r>
-            <a:r>
-              <a:rPr lang="en-US" dirty="0" smtClean="0">
-                <a:latin typeface="Arial" charset="0"/>
-              </a:rPr>
-              <a:t>PM today</a:t>
+              <a:t>due 2:00 PM today</a:t>
             </a:r>
           </a:p>
           <a:p>
@@ -9808,17 +6147,8 @@
               <a:rPr lang="en-US" dirty="0" smtClean="0">
                 <a:latin typeface="Arial" charset="0"/>
               </a:rPr>
-              <a:t>Data transfer </a:t>
-            </a:r>
-            <a:r>
-              <a:rPr lang="en-US" dirty="0" smtClean="0">
-                <a:latin typeface="Arial" charset="0"/>
-              </a:rPr>
-              <a:t>instructions (XCHG, LEA)</a:t>
-            </a:r>
-            <a:endParaRPr lang="en-US" dirty="0" smtClean="0">
-              <a:latin typeface="Arial" charset="0"/>
-            </a:endParaRPr>
+              <a:t>Data transfer instructions (XCHG, LEA)</a:t>
+            </a:r>
           </a:p>
           <a:p>
             <a:r>
@@ -9983,7 +6313,7 @@
               <a:rPr lang="en-US" smtClean="0">
                 <a:latin typeface="Garamond" charset="0"/>
               </a:rPr>
-              <a:t>9/16/15</a:t>
+              <a:t>9/20/15</a:t>
             </a:fld>
             <a:endParaRPr lang="en-US">
               <a:latin typeface="Garamond" charset="0"/>
@@ -10449,7 +6779,7 @@
               <a:rPr lang="en-US" smtClean="0">
                 <a:latin typeface="Garamond" charset="0"/>
               </a:rPr>
-              <a:t>9/16/15</a:t>
+              <a:t>9/20/15</a:t>
             </a:fld>
             <a:endParaRPr lang="en-US">
               <a:latin typeface="Garamond" charset="0"/>
@@ -10889,7 +7219,7 @@
               <a:rPr lang="en-US" smtClean="0">
                 <a:latin typeface="Garamond" charset="0"/>
               </a:rPr>
-              <a:t>9/16/15</a:t>
+              <a:t>9/20/15</a:t>
             </a:fld>
             <a:endParaRPr lang="en-US">
               <a:latin typeface="Garamond" charset="0"/>
@@ -11356,7 +7686,7 @@
               <a:rPr lang="en-US" smtClean="0">
                 <a:latin typeface="Garamond" charset="0"/>
               </a:rPr>
-              <a:t>9/16/15</a:t>
+              <a:t>9/20/15</a:t>
             </a:fld>
             <a:endParaRPr lang="en-US">
               <a:latin typeface="Garamond" charset="0"/>
@@ -11926,7 +8256,7 @@
               <a:rPr lang="en-US" smtClean="0">
                 <a:latin typeface="Garamond" charset="0"/>
               </a:rPr>
-              <a:t>9/16/15</a:t>
+              <a:t>9/20/15</a:t>
             </a:fld>
             <a:endParaRPr lang="en-US">
               <a:latin typeface="Garamond" charset="0"/>
@@ -12588,7 +8918,7 @@
               <a:rPr lang="en-US" smtClean="0">
                 <a:latin typeface="Garamond" charset="0"/>
               </a:rPr>
-              <a:t>9/16/15</a:t>
+              <a:t>9/20/15</a:t>
             </a:fld>
             <a:endParaRPr lang="en-US">
               <a:latin typeface="Garamond" charset="0"/>
@@ -13426,7 +9756,7 @@
               <a:rPr lang="en-US" smtClean="0">
                 <a:latin typeface="Garamond" charset="0"/>
               </a:rPr>
-              <a:t>9/16/15</a:t>
+              <a:t>9/20/15</a:t>
             </a:fld>
             <a:endParaRPr lang="en-US">
               <a:latin typeface="Garamond" charset="0"/>
@@ -13888,7 +10218,7 @@
       </p:grpSpPr>
       <p:sp>
         <p:nvSpPr>
-          <p:cNvPr id="7170" name="Title 1"/>
+          <p:cNvPr id="19458" name="Title 1"/>
           <p:cNvSpPr>
             <a:spLocks noGrp="1"/>
           </p:cNvSpPr>
@@ -13905,14 +10235,14 @@
               <a:rPr lang="en-US">
                 <a:latin typeface="Garamond" charset="0"/>
               </a:rPr>
-              <a:t>Multiplication/division </a:t>
-            </a:r>
-          </a:p>
-        </p:txBody>
-      </p:sp>
-      <p:sp>
-        <p:nvSpPr>
-          <p:cNvPr id="7171" name="Content Placeholder 2"/>
+              <a:t>Final notes</a:t>
+            </a:r>
+          </a:p>
+        </p:txBody>
+      </p:sp>
+      <p:sp>
+        <p:nvSpPr>
+          <p:cNvPr id="19459" name="Content Placeholder 2"/>
           <p:cNvSpPr>
             <a:spLocks noGrp="1"/>
           </p:cNvSpPr>
@@ -13926,44 +10256,88 @@
           <a:lstStyle/>
           <a:p>
             <a:r>
-              <a:rPr lang="en-US">
+              <a:rPr lang="en-US" dirty="0">
                 <a:latin typeface="Arial" charset="0"/>
               </a:rPr>
-              <a:t>Both signed and unsigned integer versions</a:t>
-            </a:r>
-          </a:p>
-          <a:p>
-            <a:r>
-              <a:rPr lang="en-US">
+              <a:t>Next time:</a:t>
+            </a:r>
+          </a:p>
+          <a:p>
+            <a:pPr lvl="1"/>
+            <a:r>
+              <a:rPr lang="en-US" dirty="0" smtClean="0">
                 <a:latin typeface="Arial" charset="0"/>
               </a:rPr>
-              <a:t>Register A is always one of the sources</a:t>
-            </a:r>
-          </a:p>
-          <a:p>
-            <a:r>
-              <a:rPr lang="en-US">
+              <a:t>Multiplication </a:t>
+            </a:r>
+            <a:r>
+              <a:rPr lang="en-US" smtClean="0">
                 <a:latin typeface="Arial" charset="0"/>
               </a:rPr>
-              <a:t>Destination always same; size-dependent</a:t>
+              <a:t>and division</a:t>
             </a:r>
           </a:p>
           <a:p>
             <a:pPr lvl="1"/>
             <a:r>
-              <a:rPr lang="en-US">
+              <a:rPr lang="en-US" dirty="0" smtClean="0">
                 <a:latin typeface="Arial" charset="0"/>
               </a:rPr>
-              <a:t>Exception: signed multiplication does allow for slightly different operation</a:t>
-            </a:r>
-          </a:p>
-          <a:p>
-            <a:r>
-              <a:rPr lang="en-US">
+              <a:t>Logical </a:t>
+            </a:r>
+            <a:r>
+              <a:rPr lang="en-US" dirty="0" smtClean="0">
                 <a:latin typeface="Arial" charset="0"/>
               </a:rPr>
-              <a:t>Easiest way to evaluate instructions: figure out decimal values of operands, do operation in decimal, then figure out binary/hex values of results</a:t>
-            </a:r>
+              <a:t>and shift instructions</a:t>
+            </a:r>
+            <a:endParaRPr lang="en-US" dirty="0">
+              <a:latin typeface="Arial" charset="0"/>
+            </a:endParaRPr>
+          </a:p>
+          <a:p>
+            <a:r>
+              <a:rPr lang="en-US" dirty="0">
+                <a:latin typeface="Arial" charset="0"/>
+              </a:rPr>
+              <a:t>Reminders:</a:t>
+            </a:r>
+          </a:p>
+          <a:p>
+            <a:pPr lvl="1"/>
+            <a:r>
+              <a:rPr lang="en-US" dirty="0">
+                <a:latin typeface="Arial" charset="0"/>
+              </a:rPr>
+              <a:t>HW 1 due 2:00 PM today</a:t>
+            </a:r>
+          </a:p>
+          <a:p>
+            <a:pPr lvl="1"/>
+            <a:r>
+              <a:rPr lang="en-US" dirty="0">
+                <a:latin typeface="Arial" charset="0"/>
+              </a:rPr>
+              <a:t>HW 2 to be posted; due 2:00 </a:t>
+            </a:r>
+            <a:r>
+              <a:rPr lang="en-US" dirty="0" smtClean="0">
+                <a:latin typeface="Arial" charset="0"/>
+              </a:rPr>
+              <a:t>PM, </a:t>
+            </a:r>
+            <a:r>
+              <a:rPr lang="en-US" dirty="0">
+                <a:latin typeface="Arial" charset="0"/>
+              </a:rPr>
+              <a:t>9/25</a:t>
+            </a:r>
+          </a:p>
+          <a:p>
+            <a:pPr lvl="1"/>
+            <a:endParaRPr lang="en-US" dirty="0">
+              <a:latin typeface="Arial" charset="0"/>
+            </a:endParaRPr>
           </a:p>
         </p:txBody>
       </p:sp>
@@ -14098,12 +10472,11 @@
           </a:lstStyle>
           <a:p>
             <a:pPr eaLnBrk="1" hangingPunct="1"/>
-            <a:fld id="{E46A709F-5707-8C46-9AB8-4F0EC9175D33}" type="datetime1">
-              <a:rPr lang="en-US">
+            <a:fld id="{BF506E05-76E7-1D48-96AD-D1932997F0FE}" type="datetime1">
+              <a:rPr lang="en-US" smtClean="0">
                 <a:latin typeface="Garamond" charset="0"/>
               </a:rPr>
-              <a:pPr eaLnBrk="1" hangingPunct="1"/>
-              <a:t>9/16/15</a:t>
+              <a:t>9/20/15</a:t>
             </a:fld>
             <a:endParaRPr lang="en-US">
               <a:latin typeface="Garamond" charset="0"/>
@@ -14130,9 +10503,10 @@
               <a:defRPr/>
             </a:pPr>
             <a:r>
-              <a:rPr lang="en-US" altLang="en-US"/>
+              <a:rPr lang="en-US" altLang="en-US" smtClean="0"/>
               <a:t>Microprocessors I:  Lecture 6</a:t>
             </a:r>
+            <a:endParaRPr lang="en-US" altLang="en-US"/>
           </a:p>
         </p:txBody>
       </p:sp>
@@ -14267,7 +10641,7 @@
           </a:lstStyle>
           <a:p>
             <a:pPr eaLnBrk="1" hangingPunct="1"/>
-            <a:fld id="{79289C23-4F38-E84A-BEEE-DFE9655C9D34}" type="slidenum">
+            <a:fld id="{7318A6F9-97BD-0640-AE56-DA2FF8060FFA}" type="slidenum">
               <a:rPr lang="en-US">
                 <a:latin typeface="Garamond" charset="0"/>
               </a:rPr>
@@ -14281,11 +10655,6 @@
         </p:txBody>
       </p:sp>
     </p:spTree>
-    <p:extLst>
-      <p:ext uri="{BB962C8B-B14F-4D97-AF65-F5344CB8AC3E}">
-        <p14:creationId xmlns:p14="http://schemas.microsoft.com/office/powerpoint/2010/main" val="709329157"/>
-      </p:ext>
-    </p:extLst>
   </p:cSld>
   <p:clrMapOvr>
     <a:masterClrMapping/>

</xml_diff>